<commit_message>
Fixes on exception handling slides
</commit_message>
<xml_diff>
--- a/Courses/Software-Sciences/Module-2-DS-and-Algo/09-Exception-Handling/09-Exception-Handling.pptx
+++ b/Courses/Software-Sciences/Module-2-DS-and-Algo/09-Exception-Handling/09-Exception-Handling.pptx
@@ -147,7 +147,7 @@
             <p14:sldId id="292"/>
           </p14:sldIdLst>
         </p14:section>
-        <p14:section name="Exception" id="{CE349CF6-EA10-4A20-877D-4BAB68E178C5}">
+        <p14:section name="Изключения" id="{CE349CF6-EA10-4A20-877D-4BAB68E178C5}">
           <p14:sldIdLst>
             <p14:sldId id="294"/>
             <p14:sldId id="494"/>
@@ -157,7 +157,7 @@
             <p14:sldId id="297"/>
           </p14:sldIdLst>
         </p14:section>
-        <p14:section name="Хвашане на exception" id="{DF2EE2B0-A873-419D-BF7D-08DBD14F089D}">
+        <p14:section name="Хващане на изключения" id="{DF2EE2B0-A873-419D-BF7D-08DBD14F089D}">
           <p14:sldIdLst>
             <p14:sldId id="299"/>
             <p14:sldId id="302"/>
@@ -321,7 +321,7 @@
           <a:p>
             <a:fld id="{4E087215-0C8F-4762-A664-737A353EC9A4}" type="datetimeFigureOut">
               <a:rPr lang="bg-BG" smtClean="0"/>
-              <a:t>24.2.2023 г.</a:t>
+              <a:t>19.08.23 г.</a:t>
             </a:fld>
             <a:endParaRPr lang="bg-BG" dirty="0"/>
           </a:p>
@@ -512,7 +512,7 @@
           <a:p>
             <a:fld id="{72D84649-876A-46C9-8472-14CB09C070D8}" type="datetimeFigureOut">
               <a:rPr lang="en-US" smtClean="0"/>
-              <a:t>2/24/2023</a:t>
+              <a:t>8/19/23</a:t>
             </a:fld>
             <a:endParaRPr lang="en-US" dirty="0"/>
           </a:p>
@@ -9846,8 +9846,8 @@
         </p:nvSpPr>
         <p:spPr>
           <a:xfrm>
-            <a:off x="555625" y="1134598"/>
-            <a:ext cx="11080750" cy="675000"/>
+            <a:off x="1840812" y="1113078"/>
+            <a:ext cx="8510375" cy="675000"/>
           </a:xfrm>
         </p:spPr>
         <p:txBody>
@@ -9860,8 +9860,29 @@
               <a:rPr lang="en-US" sz="3150" dirty="0">
                 <a:cs typeface="Calibri"/>
               </a:rPr>
-              <a:t>Хващане на грешло по време на програмат</a:t>
-            </a:r>
+              <a:t>Хващане на </a:t>
+            </a:r>
+            <a:r>
+              <a:rPr lang="bg-BG" sz="3150" dirty="0">
+                <a:cs typeface="Calibri"/>
+              </a:rPr>
+              <a:t>грешки </a:t>
+            </a:r>
+            <a:r>
+              <a:rPr lang="en-US" sz="3150" dirty="0">
+                <a:cs typeface="Calibri"/>
+              </a:rPr>
+              <a:t>по време на програмат</a:t>
+            </a:r>
+            <a:r>
+              <a:rPr lang="bg-BG" sz="3150" dirty="0">
+                <a:cs typeface="Calibri"/>
+              </a:rPr>
+              <a:t>а</a:t>
+            </a:r>
+            <a:endParaRPr lang="en-US" sz="3150" dirty="0">
+              <a:cs typeface="Calibri"/>
+            </a:endParaRPr>
           </a:p>
           <a:p>
             <a:endParaRPr lang="en-US" dirty="0">
@@ -9905,11 +9926,18 @@
               <a:t>Хващане на </a:t>
             </a:r>
             <a:r>
+              <a:rPr lang="bg-BG" sz="4750" dirty="0">
+                <a:ea typeface="+mj-lt"/>
+                <a:cs typeface="+mj-lt"/>
+              </a:rPr>
+              <a:t>грешки</a:t>
+            </a:r>
+            <a:r>
               <a:rPr lang="en-US" sz="4750" dirty="0">
                 <a:ea typeface="+mj-lt"/>
                 <a:cs typeface="+mj-lt"/>
               </a:rPr>
-              <a:t>exception </a:t>
+              <a:t> </a:t>
             </a:r>
             <a:endParaRPr lang="en-US" sz="4750" dirty="0">
               <a:cs typeface="Calibri"/>
@@ -10239,15 +10267,76 @@
               <a:rPr lang="en-US" sz="3150" dirty="0">
                 <a:cs typeface="Calibri"/>
               </a:rPr>
-              <a:t>Когато хванете </a:t>
+              <a:t>Когато </a:t>
+            </a:r>
+            <a:r>
+              <a:rPr lang="bg-BG" sz="3150" dirty="0">
+                <a:cs typeface="Calibri"/>
+              </a:rPr>
+              <a:t>хванете</a:t>
+            </a:r>
+            <a:r>
+              <a:rPr lang="en-US" sz="3150" dirty="0">
+                <a:cs typeface="Calibri"/>
+              </a:rPr>
+              <a:t> </a:t>
+            </a:r>
+            <a:r>
+              <a:rPr lang="bg-BG" sz="3150" dirty="0">
+                <a:ea typeface="+mn-lt"/>
+                <a:cs typeface="+mn-lt"/>
+              </a:rPr>
+              <a:t>изключение</a:t>
             </a:r>
             <a:r>
               <a:rPr lang="en-US" sz="3150" dirty="0">
                 <a:ea typeface="+mn-lt"/>
                 <a:cs typeface="+mn-lt"/>
               </a:rPr>
-              <a:t>exception от определен клас, може да хваните неговите деца също</a:t>
-            </a:r>
+              <a:t> от определен клас, може да </a:t>
+            </a:r>
+            <a:r>
+              <a:rPr lang="bg-BG" sz="3150" dirty="0">
+                <a:ea typeface="+mn-lt"/>
+                <a:cs typeface="+mn-lt"/>
+              </a:rPr>
+              <a:t>хванете и</a:t>
+            </a:r>
+            <a:r>
+              <a:rPr lang="en-US" sz="3150" dirty="0">
+                <a:ea typeface="+mn-lt"/>
+                <a:cs typeface="+mn-lt"/>
+              </a:rPr>
+              <a:t> </a:t>
+            </a:r>
+            <a:r>
+              <a:rPr lang="bg-BG" sz="3150" dirty="0">
+                <a:ea typeface="+mn-lt"/>
+                <a:cs typeface="+mn-lt"/>
+              </a:rPr>
+              <a:t>неговите "</a:t>
+            </a:r>
+            <a:r>
+              <a:rPr lang="bg-BG" sz="3150" b="1" dirty="0">
+                <a:solidFill>
+                  <a:schemeClr val="bg1"/>
+                </a:solidFill>
+                <a:ea typeface="+mn-lt"/>
+                <a:cs typeface="+mn-lt"/>
+              </a:rPr>
+              <a:t>изключения наследници</a:t>
+            </a:r>
+            <a:r>
+              <a:rPr lang="bg-BG" sz="3150" dirty="0">
+                <a:ea typeface="+mn-lt"/>
+                <a:cs typeface="+mn-lt"/>
+              </a:rPr>
+              <a:t>"</a:t>
+            </a:r>
+            <a:endParaRPr lang="en-US" sz="3150" dirty="0">
+              <a:ea typeface="+mn-lt"/>
+              <a:cs typeface="+mn-lt"/>
+            </a:endParaRPr>
           </a:p>
           <a:p>
             <a:pPr marL="0" indent="0">
@@ -10315,6 +10404,8 @@
                 <a:solidFill>
                   <a:schemeClr val="bg1"/>
                 </a:solidFill>
+                <a:latin typeface="Consolas" panose="020B0609020204030204" pitchFamily="49" charset="0"/>
+                <a:cs typeface="Consolas" panose="020B0609020204030204" pitchFamily="49" charset="0"/>
               </a:rPr>
               <a:t>ArithmeticException</a:t>
             </a:r>
@@ -10340,7 +10431,8 @@
                 <a:solidFill>
                   <a:schemeClr val="bg1"/>
                 </a:solidFill>
-                <a:cs typeface="Consolas" pitchFamily="49" charset="0"/>
+                <a:latin typeface="Consolas" panose="020B0609020204030204" pitchFamily="49" charset="0"/>
+                <a:cs typeface="Consolas" panose="020B0609020204030204" pitchFamily="49" charset="0"/>
               </a:rPr>
               <a:t>DivideByZeroException</a:t>
             </a:r>
@@ -10363,15 +10455,11 @@
                 <a:solidFill>
                   <a:schemeClr val="bg1"/>
                 </a:solidFill>
+                <a:latin typeface="Consolas" panose="020B0609020204030204" pitchFamily="49" charset="0"/>
+                <a:cs typeface="Consolas" panose="020B0609020204030204" pitchFamily="49" charset="0"/>
               </a:rPr>
               <a:t>OverflowException</a:t>
             </a:r>
-            <a:endParaRPr lang="en-US" sz="3150" b="1" noProof="1">
-              <a:solidFill>
-                <a:schemeClr val="bg1"/>
-              </a:solidFill>
-              <a:cs typeface="Consolas" pitchFamily="49" charset="0"/>
-            </a:endParaRPr>
           </a:p>
         </p:txBody>
       </p:sp>
@@ -10392,7 +10480,11 @@
           <a:p>
             <a:r>
               <a:rPr lang="en-US" sz="3950" dirty="0"/>
-              <a:t>Хващане на exceptions</a:t>
+              <a:t>Хващане на </a:t>
+            </a:r>
+            <a:r>
+              <a:rPr lang="bg-BG" sz="3950" dirty="0"/>
+              <a:t>изключения</a:t>
             </a:r>
             <a:endParaRPr lang="bg-BG" dirty="0"/>
           </a:p>
@@ -10409,7 +10501,7 @@
         <p:spPr bwMode="auto">
           <a:xfrm>
             <a:off x="687211" y="2439259"/>
-            <a:ext cx="9357139" cy="2478936"/>
+            <a:ext cx="9998789" cy="2478936"/>
           </a:xfrm>
           <a:prstGeom prst="rect">
             <a:avLst/>
@@ -10464,7 +10556,47 @@
                 <a:latin typeface="Consolas"/>
                 <a:cs typeface="Consolas" pitchFamily="49" charset="0"/>
               </a:rPr>
-              <a:t>  //Извършваме работа, която може да причини exception </a:t>
+              <a:t>  // Извършваме </a:t>
+            </a:r>
+            <a:r>
+              <a:rPr lang="bg-BG" sz="2350" b="1" i="1" noProof="1">
+                <a:solidFill>
+                  <a:schemeClr val="accent2"/>
+                </a:solidFill>
+                <a:latin typeface="Consolas"/>
+                <a:cs typeface="Consolas" pitchFamily="49" charset="0"/>
+              </a:rPr>
+              <a:t>операция</a:t>
+            </a:r>
+            <a:r>
+              <a:rPr lang="en-US" sz="2350" b="1" i="1" noProof="1">
+                <a:solidFill>
+                  <a:schemeClr val="accent2"/>
+                </a:solidFill>
+                <a:latin typeface="Consolas"/>
+                <a:cs typeface="Consolas" pitchFamily="49" charset="0"/>
+              </a:rPr>
+              <a:t>, която може да причини </a:t>
+            </a:r>
+            <a:r>
+              <a:rPr lang="bg-BG" sz="2350" b="1" i="1" noProof="1">
+                <a:solidFill>
+                  <a:schemeClr val="accent2"/>
+                </a:solidFill>
+                <a:latin typeface="Consolas"/>
+                <a:cs typeface="Consolas" pitchFamily="49" charset="0"/>
+              </a:rPr>
+              <a:t>изключение</a:t>
+            </a:r>
+            <a:r>
+              <a:rPr lang="en-US" sz="2350" b="1" i="1" noProof="1">
+                <a:solidFill>
+                  <a:schemeClr val="accent2"/>
+                </a:solidFill>
+                <a:latin typeface="Consolas"/>
+                <a:cs typeface="Consolas" pitchFamily="49" charset="0"/>
+              </a:rPr>
+              <a:t> </a:t>
             </a:r>
             <a:endParaRPr lang="en-US" sz="2350" b="1" i="1" noProof="1">
               <a:solidFill>
@@ -10533,7 +10665,27 @@
                 <a:latin typeface="Consolas"/>
                 <a:cs typeface="Consolas" pitchFamily="49" charset="0"/>
               </a:rPr>
-              <a:t>  // Хваща arithmetic exception</a:t>
+              <a:t>  // Хваща</a:t>
+            </a:r>
+            <a:r>
+              <a:rPr lang="bg-BG" sz="2350" b="1" i="1" noProof="1">
+                <a:solidFill>
+                  <a:schemeClr val="accent2"/>
+                </a:solidFill>
+                <a:latin typeface="Consolas"/>
+                <a:cs typeface="Consolas" pitchFamily="49" charset="0"/>
+              </a:rPr>
+              <a:t>ме</a:t>
+            </a:r>
+            <a:r>
+              <a:rPr lang="en-US" sz="2350" b="1" i="1" noProof="1">
+                <a:solidFill>
+                  <a:schemeClr val="accent2"/>
+                </a:solidFill>
+                <a:latin typeface="Consolas"/>
+                <a:cs typeface="Consolas" pitchFamily="49" charset="0"/>
+              </a:rPr>
+              <a:t> arithmetic exception</a:t>
             </a:r>
           </a:p>
           <a:p>
@@ -10633,7 +10785,7 @@
                             </p:stCondLst>
                             <p:childTnLst>
                               <p:par>
-                                <p:cTn id="5" presetID="1" presetClass="entr" presetSubtype="0" fill="hold" grpId="0" nodeType="clickEffect">
+                                <p:cTn id="5" presetID="1" presetClass="entr" presetSubtype="0" fill="hold" nodeType="clickEffect">
                                   <p:stCondLst>
                                     <p:cond delay="0"/>
                                   </p:stCondLst>
@@ -10641,113 +10793,6 @@
                                     <p:set>
                                       <p:cBhvr>
                                         <p:cTn id="6" dur="1" fill="hold">
-                                          <p:stCondLst>
-                                            <p:cond delay="0"/>
-                                          </p:stCondLst>
-                                        </p:cTn>
-                                        <p:tgtEl>
-                                          <p:spTgt spid="553988"/>
-                                        </p:tgtEl>
-                                        <p:attrNameLst>
-                                          <p:attrName>style.visibility</p:attrName>
-                                        </p:attrNameLst>
-                                      </p:cBhvr>
-                                      <p:to>
-                                        <p:strVal val="visible"/>
-                                      </p:to>
-                                    </p:set>
-                                  </p:childTnLst>
-                                </p:cTn>
-                              </p:par>
-                              <p:par>
-                                <p:cTn id="7" presetID="1" presetClass="entr" presetSubtype="0" fill="hold" nodeType="withEffect">
-                                  <p:stCondLst>
-                                    <p:cond delay="0"/>
-                                  </p:stCondLst>
-                                  <p:childTnLst>
-                                    <p:set>
-                                      <p:cBhvr>
-                                        <p:cTn id="8" dur="1" fill="hold">
-                                          <p:stCondLst>
-                                            <p:cond delay="0"/>
-                                          </p:stCondLst>
-                                        </p:cTn>
-                                        <p:tgtEl>
-                                          <p:spTgt spid="553988">
-                                            <p:txEl>
-                                              <p:pRg st="0" end="0"/>
-                                            </p:txEl>
-                                          </p:spTgt>
-                                        </p:tgtEl>
-                                        <p:attrNameLst>
-                                          <p:attrName>style.visibility</p:attrName>
-                                        </p:attrNameLst>
-                                      </p:cBhvr>
-                                      <p:to>
-                                        <p:strVal val="visible"/>
-                                      </p:to>
-                                    </p:set>
-                                  </p:childTnLst>
-                                </p:cTn>
-                              </p:par>
-                              <p:par>
-                                <p:cTn id="9" presetID="1" presetClass="entr" presetSubtype="0" fill="hold" nodeType="withEffect">
-                                  <p:stCondLst>
-                                    <p:cond delay="0"/>
-                                  </p:stCondLst>
-                                  <p:childTnLst>
-                                    <p:set>
-                                      <p:cBhvr>
-                                        <p:cTn id="10" dur="1" fill="hold">
-                                          <p:stCondLst>
-                                            <p:cond delay="0"/>
-                                          </p:stCondLst>
-                                        </p:cTn>
-                                        <p:tgtEl>
-                                          <p:spTgt spid="553988">
-                                            <p:txEl>
-                                              <p:pRg st="2" end="2"/>
-                                            </p:txEl>
-                                          </p:spTgt>
-                                        </p:tgtEl>
-                                        <p:attrNameLst>
-                                          <p:attrName>style.visibility</p:attrName>
-                                        </p:attrNameLst>
-                                      </p:cBhvr>
-                                      <p:to>
-                                        <p:strVal val="visible"/>
-                                      </p:to>
-                                    </p:set>
-                                  </p:childTnLst>
-                                </p:cTn>
-                              </p:par>
-                            </p:childTnLst>
-                          </p:cTn>
-                        </p:par>
-                      </p:childTnLst>
-                    </p:cTn>
-                  </p:par>
-                  <p:par>
-                    <p:cTn id="11" fill="hold">
-                      <p:stCondLst>
-                        <p:cond delay="indefinite"/>
-                      </p:stCondLst>
-                      <p:childTnLst>
-                        <p:par>
-                          <p:cTn id="12" fill="hold">
-                            <p:stCondLst>
-                              <p:cond delay="0"/>
-                            </p:stCondLst>
-                            <p:childTnLst>
-                              <p:par>
-                                <p:cTn id="13" presetID="1" presetClass="entr" presetSubtype="0" fill="hold" nodeType="clickEffect">
-                                  <p:stCondLst>
-                                    <p:cond delay="0"/>
-                                  </p:stCondLst>
-                                  <p:childTnLst>
-                                    <p:set>
-                                      <p:cBhvr>
-                                        <p:cTn id="14" dur="1" fill="hold">
                                           <p:stCondLst>
                                             <p:cond delay="0"/>
                                           </p:stCondLst>
@@ -10777,26 +10822,26 @@
                     </p:cTn>
                   </p:par>
                   <p:par>
-                    <p:cTn id="15" fill="hold">
+                    <p:cTn id="7" fill="hold">
                       <p:stCondLst>
                         <p:cond delay="indefinite"/>
                       </p:stCondLst>
                       <p:childTnLst>
                         <p:par>
-                          <p:cTn id="16" fill="hold">
+                          <p:cTn id="8" fill="hold">
                             <p:stCondLst>
                               <p:cond delay="0"/>
                             </p:stCondLst>
                             <p:childTnLst>
                               <p:par>
-                                <p:cTn id="17" presetID="1" presetClass="entr" presetSubtype="0" fill="hold" nodeType="clickEffect">
+                                <p:cTn id="9" presetID="1" presetClass="entr" presetSubtype="0" fill="hold" nodeType="clickEffect">
                                   <p:stCondLst>
                                     <p:cond delay="0"/>
                                   </p:stCondLst>
                                   <p:childTnLst>
                                     <p:set>
                                       <p:cBhvr>
-                                        <p:cTn id="18" dur="1" fill="hold">
+                                        <p:cTn id="10" dur="1" fill="hold">
                                           <p:stCondLst>
                                             <p:cond delay="0"/>
                                           </p:stCondLst>
@@ -10820,14 +10865,14 @@
                                 </p:cTn>
                               </p:par>
                               <p:par>
-                                <p:cTn id="19" presetID="1" presetClass="entr" presetSubtype="0" fill="hold" nodeType="withEffect">
+                                <p:cTn id="11" presetID="1" presetClass="entr" presetSubtype="0" fill="hold" nodeType="withEffect">
                                   <p:stCondLst>
                                     <p:cond delay="0"/>
                                   </p:stCondLst>
                                   <p:childTnLst>
                                     <p:set>
                                       <p:cBhvr>
-                                        <p:cTn id="20" dur="1" fill="hold">
+                                        <p:cTn id="12" dur="1" fill="hold">
                                           <p:stCondLst>
                                             <p:cond delay="0"/>
                                           </p:stCondLst>
@@ -10857,26 +10902,26 @@
                     </p:cTn>
                   </p:par>
                   <p:par>
-                    <p:cTn id="21" fill="hold">
+                    <p:cTn id="13" fill="hold">
                       <p:stCondLst>
                         <p:cond delay="indefinite"/>
                       </p:stCondLst>
                       <p:childTnLst>
                         <p:par>
-                          <p:cTn id="22" fill="hold">
+                          <p:cTn id="14" fill="hold">
                             <p:stCondLst>
                               <p:cond delay="0"/>
                             </p:stCondLst>
                             <p:childTnLst>
                               <p:par>
-                                <p:cTn id="23" presetID="1" presetClass="entr" presetSubtype="0" fill="hold" nodeType="clickEffect">
+                                <p:cTn id="15" presetID="1" presetClass="entr" presetSubtype="0" fill="hold" nodeType="clickEffect">
                                   <p:stCondLst>
                                     <p:cond delay="0"/>
                                   </p:stCondLst>
                                   <p:childTnLst>
                                     <p:set>
                                       <p:cBhvr>
-                                        <p:cTn id="24" dur="1" fill="hold">
+                                        <p:cTn id="16" dur="1" fill="hold">
                                           <p:stCondLst>
                                             <p:cond delay="0"/>
                                           </p:stCondLst>
@@ -10906,26 +10951,26 @@
                     </p:cTn>
                   </p:par>
                   <p:par>
-                    <p:cTn id="25" fill="hold">
+                    <p:cTn id="17" fill="hold">
                       <p:stCondLst>
                         <p:cond delay="indefinite"/>
                       </p:stCondLst>
                       <p:childTnLst>
                         <p:par>
-                          <p:cTn id="26" fill="hold">
+                          <p:cTn id="18" fill="hold">
                             <p:stCondLst>
                               <p:cond delay="0"/>
                             </p:stCondLst>
                             <p:childTnLst>
                               <p:par>
-                                <p:cTn id="27" presetID="1" presetClass="entr" presetSubtype="0" fill="hold" nodeType="clickEffect">
+                                <p:cTn id="19" presetID="1" presetClass="entr" presetSubtype="0" fill="hold" nodeType="clickEffect">
                                   <p:stCondLst>
                                     <p:cond delay="0"/>
                                   </p:stCondLst>
                                   <p:childTnLst>
                                     <p:set>
                                       <p:cBhvr>
-                                        <p:cTn id="28" dur="1" fill="hold">
+                                        <p:cTn id="20" dur="1" fill="hold">
                                           <p:stCondLst>
                                             <p:cond delay="0"/>
                                           </p:stCondLst>
@@ -10975,9 +11020,6 @@
         </p:cTn>
       </p:par>
     </p:tnLst>
-    <p:bldLst>
-      <p:bldP spid="553988" grpId="0" animBg="1"/>
-    </p:bldLst>
   </p:timing>
 </p:sld>
 </file>
@@ -11001,64 +11043,6 @@
       </p:grpSpPr>
       <p:sp>
         <p:nvSpPr>
-          <p:cNvPr id="2" name="Title 1">
-            <a:extLst>
-              <a:ext uri="{FF2B5EF4-FFF2-40B4-BE49-F238E27FC236}">
-                <a16:creationId xmlns:a16="http://schemas.microsoft.com/office/drawing/2014/main" id="{85773322-B777-4E65-BD66-EBB1187860B5}"/>
-              </a:ext>
-            </a:extLst>
-          </p:cNvPr>
-          <p:cNvSpPr>
-            <a:spLocks noGrp="1"/>
-          </p:cNvSpPr>
-          <p:nvPr>
-            <p:ph type="title"/>
-          </p:nvPr>
-        </p:nvSpPr>
-        <p:spPr/>
-        <p:txBody>
-          <a:bodyPr vert="horz" lIns="108000" tIns="36000" rIns="108000" bIns="36000" rtlCol="0" anchor="ctr" anchorCtr="0">
-            <a:noAutofit/>
-          </a:bodyPr>
-          <a:lstStyle/>
-          <a:p>
-            <a:r>
-              <a:rPr lang="en-US" sz="2900" dirty="0"/>
-              <a:t>Използване на много пъти блока </a:t>
-            </a:r>
-            <a:r>
-              <a:rPr lang="ru-RU" sz="2900" dirty="0">
-                <a:solidFill>
-                  <a:schemeClr val="bg1"/>
-                </a:solidFill>
-                <a:latin typeface="Consolas"/>
-              </a:rPr>
-              <a:t>catch</a:t>
-            </a:r>
-            <a:r>
-              <a:rPr lang="ru-RU" sz="2900" b="0" dirty="0">
-                <a:solidFill>
-                  <a:schemeClr val="tx2">
-                    <a:lumMod val="75000"/>
-                  </a:schemeClr>
-                </a:solidFill>
-                <a:ea typeface="+mj-lt"/>
-                <a:cs typeface="+mj-lt"/>
-              </a:rPr>
-              <a:t> </a:t>
-            </a:r>
-            <a:r>
-              <a:rPr lang="en-US" sz="2900" dirty="0"/>
-              <a:t> – примери</a:t>
-            </a:r>
-            <a:endParaRPr lang="en-US" sz="2900" dirty="0">
-              <a:cs typeface="Calibri"/>
-            </a:endParaRPr>
-          </a:p>
-        </p:txBody>
-      </p:sp>
-      <p:sp>
-        <p:nvSpPr>
           <p:cNvPr id="5" name="Text Placeholder 4">
             <a:extLst>
               <a:ext uri="{FF2B5EF4-FFF2-40B4-BE49-F238E27FC236}">
@@ -11074,10 +11058,6 @@
           </p:nvPr>
         </p:nvSpPr>
         <p:spPr bwMode="auto">
-          <a:xfrm>
-            <a:off x="2210813" y="1179731"/>
-            <a:ext cx="9293979" cy="5252230"/>
-          </a:xfrm>
           <a:prstGeom prst="rect">
             <a:avLst/>
           </a:prstGeom>
@@ -11380,6 +11360,65 @@
             <a:endParaRPr lang="bg-BG" sz="2396" b="1" noProof="1">
               <a:latin typeface="Consolas" pitchFamily="49" charset="0"/>
               <a:cs typeface="Consolas" pitchFamily="49" charset="0"/>
+            </a:endParaRPr>
+          </a:p>
+        </p:txBody>
+      </p:sp>
+      <p:sp>
+        <p:nvSpPr>
+          <p:cNvPr id="2" name="Title 1">
+            <a:extLst>
+              <a:ext uri="{FF2B5EF4-FFF2-40B4-BE49-F238E27FC236}">
+                <a16:creationId xmlns:a16="http://schemas.microsoft.com/office/drawing/2014/main" id="{85773322-B777-4E65-BD66-EBB1187860B5}"/>
+              </a:ext>
+            </a:extLst>
+          </p:cNvPr>
+          <p:cNvSpPr>
+            <a:spLocks noGrp="1"/>
+          </p:cNvSpPr>
+          <p:nvPr>
+            <p:ph type="title"/>
+          </p:nvPr>
+        </p:nvSpPr>
+        <p:spPr/>
+        <p:txBody>
+          <a:bodyPr vert="horz" lIns="108000" tIns="36000" rIns="108000" bIns="36000" rtlCol="0" anchor="ctr" anchorCtr="0">
+            <a:noAutofit/>
+          </a:bodyPr>
+          <a:lstStyle/>
+          <a:p>
+            <a:r>
+              <a:rPr lang="bg-BG" sz="3600" dirty="0"/>
+              <a:t>Многократно използване на </a:t>
+            </a:r>
+            <a:r>
+              <a:rPr lang="en-US" sz="3600" dirty="0">
+                <a:latin typeface="Consolas"/>
+              </a:rPr>
+              <a:t>catch</a:t>
+            </a:r>
+            <a:r>
+              <a:rPr lang="ru-RU" sz="3600" b="0" dirty="0">
+                <a:solidFill>
+                  <a:schemeClr val="tx2">
+                    <a:lumMod val="75000"/>
+                  </a:schemeClr>
+                </a:solidFill>
+                <a:ea typeface="+mj-lt"/>
+                <a:cs typeface="+mj-lt"/>
+              </a:rPr>
+              <a:t> </a:t>
+            </a:r>
+            <a:r>
+              <a:rPr lang="en-US" sz="3600" dirty="0"/>
+              <a:t>– </a:t>
+            </a:r>
+            <a:r>
+              <a:rPr lang="bg-BG" sz="3600" dirty="0"/>
+              <a:t>Пример</a:t>
+            </a:r>
+            <a:endParaRPr lang="en-US" sz="3600" dirty="0">
+              <a:cs typeface="Calibri"/>
             </a:endParaRPr>
           </a:p>
         </p:txBody>
@@ -12412,7 +12451,7 @@
         <p:spPr bwMode="auto">
           <a:xfrm>
             <a:off x="4970737" y="3730245"/>
-            <a:ext cx="2742486" cy="609557"/>
+            <a:ext cx="5130264" cy="609557"/>
           </a:xfrm>
           <a:prstGeom prst="wedgeRoundRectCallout">
             <a:avLst>
@@ -12462,12 +12501,12 @@
           <a:p>
             <a:pPr algn="ctr"/>
             <a:r>
-              <a:rPr lang="en-US" sz="2350" b="1" noProof="1">
+              <a:rPr lang="bg-BG" sz="2350" b="1" noProof="1">
                 <a:solidFill>
                   <a:srgbClr val="FFFFFF"/>
                 </a:solidFill>
               </a:rPr>
-              <a:t>Неразчитим код</a:t>
+              <a:t>Няма как да достигнем до този код</a:t>
             </a:r>
             <a:endParaRPr lang="bg-BG" dirty="0"/>
           </a:p>
@@ -12490,7 +12529,7 @@
         <p:spPr bwMode="auto">
           <a:xfrm>
             <a:off x="5334198" y="4836205"/>
-            <a:ext cx="2742486" cy="609557"/>
+            <a:ext cx="5130264" cy="609557"/>
           </a:xfrm>
           <a:prstGeom prst="wedgeRoundRectCallout">
             <a:avLst>
@@ -12540,14 +12579,14 @@
           <a:p>
             <a:pPr algn="ctr"/>
             <a:r>
-              <a:rPr lang="en-US" sz="2350" b="1" noProof="1">
+              <a:rPr lang="bg-BG" sz="2400" b="1" noProof="1">
                 <a:solidFill>
                   <a:srgbClr val="FFFFFF"/>
                 </a:solidFill>
               </a:rPr>
-              <a:t>Недостижим код</a:t>
-            </a:r>
-            <a:endParaRPr lang="bg-BG" dirty="0"/>
+              <a:t>Няма как да достигнем до този код</a:t>
+            </a:r>
+            <a:endParaRPr lang="bg-BG" sz="2400" dirty="0"/>
           </a:p>
         </p:txBody>
       </p:sp>
@@ -13271,7 +13310,71 @@
               <a:rPr lang="en-US" sz="3600" dirty="0">
                 <a:cs typeface="Calibri"/>
               </a:rPr>
-              <a:t>За да хванем всички грешки може да използваме конструктура:</a:t>
+              <a:t>За да хванем </a:t>
+            </a:r>
+            <a:r>
+              <a:rPr lang="en-US" sz="3600" b="1" dirty="0">
+                <a:solidFill>
+                  <a:schemeClr val="bg1"/>
+                </a:solidFill>
+                <a:cs typeface="Calibri"/>
+              </a:rPr>
+              <a:t>всички грешки</a:t>
+            </a:r>
+            <a:r>
+              <a:rPr lang="bg-BG" sz="3600" dirty="0">
+                <a:cs typeface="Calibri"/>
+              </a:rPr>
+              <a:t>,</a:t>
+            </a:r>
+            <a:r>
+              <a:rPr lang="bg-BG" sz="3600" b="1" dirty="0">
+                <a:solidFill>
+                  <a:schemeClr val="bg1"/>
+                </a:solidFill>
+                <a:cs typeface="Calibri"/>
+              </a:rPr>
+              <a:t> </a:t>
+            </a:r>
+            <a:r>
+              <a:rPr lang="en-US" sz="3600" dirty="0">
+                <a:cs typeface="Calibri"/>
+              </a:rPr>
+              <a:t>може да </a:t>
+            </a:r>
+            <a:r>
+              <a:rPr lang="en-US" sz="3600" dirty="0" err="1">
+                <a:cs typeface="Calibri"/>
+              </a:rPr>
+              <a:t>използваме</a:t>
+            </a:r>
+            <a:r>
+              <a:rPr lang="en-US" sz="3600" dirty="0">
+                <a:cs typeface="Calibri"/>
+              </a:rPr>
+              <a:t> </a:t>
+            </a:r>
+            <a:r>
+              <a:rPr lang="bg-BG" sz="3600" dirty="0">
+                <a:cs typeface="Calibri"/>
+              </a:rPr>
+              <a:t>конструкцията </a:t>
+            </a:r>
+            <a:r>
+              <a:rPr lang="en-US" sz="3600" b="1" dirty="0">
+                <a:solidFill>
+                  <a:schemeClr val="bg1"/>
+                </a:solidFill>
+                <a:latin typeface="Consolas" panose="020B0609020204030204" pitchFamily="49" charset="0"/>
+                <a:cs typeface="Consolas" panose="020B0609020204030204" pitchFamily="49" charset="0"/>
+              </a:rPr>
+              <a:t>try-catch</a:t>
+            </a:r>
+            <a:r>
+              <a:rPr lang="en-US" sz="3600" dirty="0">
+                <a:cs typeface="Calibri"/>
+              </a:rPr>
+              <a:t>:</a:t>
             </a:r>
           </a:p>
         </p:txBody>
@@ -13293,9 +13396,12 @@
           <a:p>
             <a:r>
               <a:rPr lang="en-US" sz="3950" dirty="0"/>
-              <a:t>Хващане на всички exception-и</a:t>
-            </a:r>
-            <a:endParaRPr lang="bg-BG" sz="3950" dirty="0"/>
+              <a:t>Хващане на всички </a:t>
+            </a:r>
+            <a:r>
+              <a:rPr lang="bg-BG" sz="3950" dirty="0"/>
+              <a:t>изключения</a:t>
+            </a:r>
           </a:p>
         </p:txBody>
       </p:sp>
@@ -13309,8 +13415,8 @@
         </p:nvSpPr>
         <p:spPr bwMode="auto">
           <a:xfrm>
-            <a:off x="639679" y="2898688"/>
-            <a:ext cx="11367376" cy="3752425"/>
+            <a:off x="291000" y="2529000"/>
+            <a:ext cx="11717498" cy="3752425"/>
           </a:xfrm>
           <a:prstGeom prst="rect">
             <a:avLst/>
@@ -13386,10 +13492,50 @@
                 <a:latin typeface="Consolas"/>
                 <a:cs typeface="Consolas" pitchFamily="49" charset="0"/>
               </a:rPr>
-              <a:t>// Извършваме работа, която може да причени </a:t>
+              <a:t>// Извършваме </a:t>
+            </a:r>
+            <a:r>
+              <a:rPr lang="bg-BG" sz="2750" b="1" i="1" noProof="1">
+                <a:solidFill>
+                  <a:schemeClr val="accent2"/>
+                </a:solidFill>
+                <a:latin typeface="Consolas"/>
+                <a:cs typeface="Consolas" pitchFamily="49" charset="0"/>
+              </a:rPr>
+              <a:t>операция</a:t>
             </a:r>
             <a:r>
               <a:rPr lang="en-US" sz="2750" b="1" i="1" noProof="1">
+                <a:solidFill>
+                  <a:schemeClr val="accent2"/>
+                </a:solidFill>
+                <a:latin typeface="Consolas"/>
+                <a:cs typeface="Consolas" pitchFamily="49" charset="0"/>
+              </a:rPr>
+              <a:t>, която може да прич</a:t>
+            </a:r>
+            <a:r>
+              <a:rPr lang="bg-BG" sz="2750" b="1" i="1" noProof="1">
+                <a:solidFill>
+                  <a:schemeClr val="accent2"/>
+                </a:solidFill>
+                <a:latin typeface="Consolas"/>
+                <a:cs typeface="Consolas" pitchFamily="49" charset="0"/>
+              </a:rPr>
+              <a:t>и</a:t>
+            </a:r>
+            <a:r>
+              <a:rPr lang="en-US" sz="2750" b="1" i="1" noProof="1">
+                <a:solidFill>
+                  <a:schemeClr val="accent2"/>
+                </a:solidFill>
+                <a:latin typeface="Consolas"/>
+                <a:cs typeface="Consolas" pitchFamily="49" charset="0"/>
+              </a:rPr>
+              <a:t>ни </a:t>
+            </a:r>
+            <a:r>
+              <a:rPr lang="bg-BG" sz="2750" b="1" i="1" noProof="1">
                 <a:solidFill>
                   <a:schemeClr val="accent2"/>
                 </a:solidFill>
@@ -13397,7 +13543,7 @@
                 <a:ea typeface="+mn-lt"/>
                 <a:cs typeface="+mn-lt"/>
               </a:rPr>
-              <a:t>exception</a:t>
+              <a:t>изключение</a:t>
             </a:r>
             <a:r>
               <a:rPr lang="en-US" sz="2750" b="1" noProof="1">
@@ -13937,10 +14083,16 @@
           <a:p>
             <a:pPr marL="360045" indent="-360045"/>
             <a:r>
+              <a:rPr lang="bg-BG" sz="3600" dirty="0">
+                <a:cs typeface="Calibri"/>
+              </a:rPr>
+              <a:t>Конструкцията</a:t>
+            </a:r>
+            <a:r>
               <a:rPr lang="en-US" sz="3600" dirty="0">
                 <a:cs typeface="Calibri"/>
               </a:rPr>
-              <a:t>Изразът </a:t>
+              <a:t> </a:t>
             </a:r>
             <a:r>
               <a:rPr lang="en-US" sz="3600" b="1" dirty="0">
@@ -13959,32 +14111,50 @@
               <a:t> винаги изпълнява </a:t>
             </a:r>
             <a:r>
-              <a:rPr lang="en-US" sz="3600" dirty="0" err="1">
+              <a:rPr lang="bg-BG" sz="3600" dirty="0">
                 <a:cs typeface="Calibri"/>
               </a:rPr>
-              <a:t>блокът</a:t>
+              <a:t>блока </a:t>
+            </a:r>
+            <a:r>
+              <a:rPr lang="en-US" sz="3600" b="1" dirty="0">
+                <a:solidFill>
+                  <a:schemeClr val="bg1"/>
+                </a:solidFill>
+                <a:latin typeface="Consolas"/>
+                <a:cs typeface="Calibri"/>
+              </a:rPr>
+              <a:t>finally</a:t>
             </a:r>
             <a:r>
               <a:rPr lang="en-US" sz="3600" dirty="0">
                 <a:cs typeface="Calibri"/>
               </a:rPr>
-              <a:t> </a:t>
-            </a:r>
-            <a:r>
-              <a:rPr lang="en-US" sz="3600" b="1" dirty="0">
-                <a:solidFill>
-                  <a:schemeClr val="bg1"/>
-                </a:solidFill>
-                <a:latin typeface="Consolas"/>
+              <a:t> (</a:t>
+            </a:r>
+            <a:r>
+              <a:rPr lang="bg-BG" sz="3600" dirty="0">
                 <a:cs typeface="Calibri"/>
               </a:rPr>
-              <a:t>finally</a:t>
+              <a:t>дори и</a:t>
             </a:r>
             <a:r>
               <a:rPr lang="en-US" sz="3600" dirty="0">
                 <a:cs typeface="Calibri"/>
               </a:rPr>
-              <a:t> (без да има грешки):</a:t>
+              <a:t> да </a:t>
+            </a:r>
+            <a:r>
+              <a:rPr lang="bg-BG" sz="3600" dirty="0">
+                <a:cs typeface="Calibri"/>
+              </a:rPr>
+              <a:t>няма</a:t>
+            </a:r>
+            <a:r>
+              <a:rPr lang="en-US" sz="3600" dirty="0">
+                <a:cs typeface="Calibri"/>
+              </a:rPr>
+              <a:t> грешки):</a:t>
             </a:r>
             <a:endParaRPr lang="en-US" sz="3600" dirty="0"/>
           </a:p>
@@ -14052,7 +14222,19 @@
               <a:rPr lang="en-US" sz="3600" dirty="0">
                 <a:cs typeface="Calibri"/>
               </a:rPr>
-              <a:t> (освобождаване на ресурси)</a:t>
+              <a:t> </a:t>
+            </a:r>
+            <a:r>
+              <a:rPr lang="bg-BG" sz="3600" dirty="0">
+                <a:cs typeface="Calibri"/>
+              </a:rPr>
+              <a:t>и </a:t>
+            </a:r>
+            <a:r>
+              <a:rPr lang="en-US" sz="3600" dirty="0">
+                <a:cs typeface="Calibri"/>
+              </a:rPr>
+              <a:t>освобождаване на ресурси</a:t>
             </a:r>
           </a:p>
         </p:txBody>
@@ -14075,10 +14257,24 @@
           <a:lstStyle/>
           <a:p>
             <a:r>
-              <a:rPr lang="en-US" sz="3950" dirty="0"/>
-              <a:t>Изразът Try-finally </a:t>
-            </a:r>
-            <a:endParaRPr lang="bg-BG" sz="3950" dirty="0"/>
+              <a:rPr lang="bg-BG" sz="4000" dirty="0"/>
+              <a:t>Конструкцията</a:t>
+            </a:r>
+            <a:r>
+              <a:rPr lang="en-US" sz="4000" dirty="0"/>
+              <a:t> </a:t>
+            </a:r>
+            <a:r>
+              <a:rPr lang="en-US" sz="4000" dirty="0">
+                <a:latin typeface="Consolas" panose="020B0609020204030204" pitchFamily="49" charset="0"/>
+                <a:cs typeface="Consolas" panose="020B0609020204030204" pitchFamily="49" charset="0"/>
+              </a:rPr>
+              <a:t>try-finally </a:t>
+            </a:r>
+            <a:endParaRPr lang="bg-BG" sz="4000" dirty="0">
+              <a:latin typeface="Consolas" panose="020B0609020204030204" pitchFamily="49" charset="0"/>
+              <a:cs typeface="Consolas" panose="020B0609020204030204" pitchFamily="49" charset="0"/>
+            </a:endParaRPr>
           </a:p>
         </p:txBody>
       </p:sp>
@@ -14092,8 +14288,8 @@
         </p:nvSpPr>
         <p:spPr bwMode="auto">
           <a:xfrm>
-            <a:off x="695401" y="2378324"/>
-            <a:ext cx="10237866" cy="2863721"/>
+            <a:off x="695400" y="2545279"/>
+            <a:ext cx="10845599" cy="2863721"/>
           </a:xfrm>
           <a:prstGeom prst="rect">
             <a:avLst/>
@@ -14148,7 +14344,47 @@
                 <a:latin typeface="Consolas"/>
                 <a:cs typeface="Consolas" pitchFamily="49" charset="0"/>
               </a:rPr>
-              <a:t>  // Извършваме работа, която може да прични грешка</a:t>
+              <a:t>  // Извършваме </a:t>
+            </a:r>
+            <a:r>
+              <a:rPr lang="bg-BG" sz="2750" b="1" i="1" noProof="1">
+                <a:solidFill>
+                  <a:schemeClr val="accent2"/>
+                </a:solidFill>
+                <a:latin typeface="Consolas"/>
+                <a:cs typeface="Consolas" pitchFamily="49" charset="0"/>
+              </a:rPr>
+              <a:t>операция</a:t>
+            </a:r>
+            <a:r>
+              <a:rPr lang="en-US" sz="2750" b="1" i="1" noProof="1">
+                <a:solidFill>
+                  <a:schemeClr val="accent2"/>
+                </a:solidFill>
+                <a:latin typeface="Consolas"/>
+                <a:cs typeface="Consolas" pitchFamily="49" charset="0"/>
+              </a:rPr>
+              <a:t>, която може да прич</a:t>
+            </a:r>
+            <a:r>
+              <a:rPr lang="bg-BG" sz="2750" b="1" i="1" noProof="1">
+                <a:solidFill>
+                  <a:schemeClr val="accent2"/>
+                </a:solidFill>
+                <a:latin typeface="Consolas"/>
+                <a:cs typeface="Consolas" pitchFamily="49" charset="0"/>
+              </a:rPr>
+              <a:t>и</a:t>
+            </a:r>
+            <a:r>
+              <a:rPr lang="en-US" sz="2750" b="1" i="1" noProof="1">
+                <a:solidFill>
+                  <a:schemeClr val="accent2"/>
+                </a:solidFill>
+                <a:latin typeface="Consolas"/>
+                <a:cs typeface="Consolas" pitchFamily="49" charset="0"/>
+              </a:rPr>
+              <a:t>ни грешка</a:t>
             </a:r>
             <a:endParaRPr lang="en-US" sz="2750" b="1" i="1" noProof="1">
               <a:solidFill>
@@ -14217,7 +14453,27 @@
                 <a:latin typeface="Consolas"/>
                 <a:cs typeface="Consolas" pitchFamily="49" charset="0"/>
               </a:rPr>
-              <a:t>// блокът винаги ще се изпълни</a:t>
+              <a:t>// </a:t>
+            </a:r>
+            <a:r>
+              <a:rPr lang="bg-BG" sz="2750" b="1" i="1" noProof="1">
+                <a:solidFill>
+                  <a:schemeClr val="accent2"/>
+                </a:solidFill>
+                <a:latin typeface="Consolas"/>
+                <a:cs typeface="Consolas" pitchFamily="49" charset="0"/>
+              </a:rPr>
+              <a:t>Б</a:t>
+            </a:r>
+            <a:r>
+              <a:rPr lang="en-US" sz="2750" b="1" i="1" noProof="1">
+                <a:solidFill>
+                  <a:schemeClr val="accent2"/>
+                </a:solidFill>
+                <a:latin typeface="Consolas"/>
+                <a:cs typeface="Consolas" pitchFamily="49" charset="0"/>
+              </a:rPr>
+              <a:t>локът винаги ще се изпълни</a:t>
             </a:r>
             <a:endParaRPr lang="en-US" sz="2750" b="1" i="1" noProof="1">
               <a:solidFill>
@@ -14666,16 +14922,25 @@
         </p:nvSpPr>
         <p:spPr/>
         <p:txBody>
-          <a:bodyPr/>
+          <a:bodyPr>
+            <a:normAutofit/>
+          </a:bodyPr>
           <a:lstStyle/>
           <a:p>
             <a:r>
-              <a:rPr lang="en-US" sz="3950" dirty="0">
+              <a:rPr lang="en-US" sz="4000" dirty="0">
+                <a:latin typeface="Consolas" panose="020B0609020204030204" pitchFamily="49" charset="0"/>
+                <a:cs typeface="Consolas" panose="020B0609020204030204" pitchFamily="49" charset="0"/>
+              </a:rPr>
+              <a:t>Try-finally</a:t>
+            </a:r>
+            <a:r>
+              <a:rPr lang="en-US" sz="4000" dirty="0">
                 <a:cs typeface="Consolas" pitchFamily="49" charset="0"/>
               </a:rPr>
-              <a:t>Try-finally – Пример</a:t>
-            </a:r>
-            <a:endParaRPr lang="bg-BG" dirty="0"/>
+              <a:t> – Пример</a:t>
+            </a:r>
+            <a:endParaRPr lang="bg-BG" sz="4000" dirty="0"/>
           </a:p>
         </p:txBody>
       </p:sp>
@@ -15553,6 +15818,53 @@
       </p:pic>
       <p:sp>
         <p:nvSpPr>
+          <p:cNvPr id="3" name="Subtitle 2">
+            <a:extLst>
+              <a:ext uri="{FF2B5EF4-FFF2-40B4-BE49-F238E27FC236}">
+                <a16:creationId xmlns:a16="http://schemas.microsoft.com/office/drawing/2014/main" id="{2572CC87-7E4C-3CFA-39FF-32594C6391A4}"/>
+              </a:ext>
+            </a:extLst>
+          </p:cNvPr>
+          <p:cNvSpPr>
+            <a:spLocks noGrp="1"/>
+          </p:cNvSpPr>
+          <p:nvPr>
+            <p:ph type="subTitle" sz="quarter" idx="11"/>
+          </p:nvPr>
+        </p:nvSpPr>
+        <p:spPr/>
+        <p:txBody>
+          <a:bodyPr/>
+          <a:lstStyle/>
+          <a:p>
+            <a:r>
+              <a:rPr lang="bg-BG" sz="4000" dirty="0">
+                <a:cs typeface="Arial"/>
+              </a:rPr>
+              <a:t>Ключовата </a:t>
+            </a:r>
+            <a:r>
+              <a:rPr lang="en-US" sz="4000" dirty="0">
+                <a:cs typeface="Arial"/>
+              </a:rPr>
+              <a:t>дума </a:t>
+            </a:r>
+            <a:r>
+              <a:rPr lang="en-US" sz="4000" dirty="0">
+                <a:latin typeface="Consolas" panose="020B0609020204030204" pitchFamily="49" charset="0"/>
+                <a:cs typeface="Consolas" panose="020B0609020204030204" pitchFamily="49" charset="0"/>
+              </a:rPr>
+              <a:t>Throw</a:t>
+            </a:r>
+            <a:endParaRPr lang="en-BG" dirty="0">
+              <a:latin typeface="Consolas" panose="020B0609020204030204" pitchFamily="49" charset="0"/>
+              <a:cs typeface="Consolas" panose="020B0609020204030204" pitchFamily="49" charset="0"/>
+            </a:endParaRPr>
+          </a:p>
+        </p:txBody>
+      </p:sp>
+      <p:sp>
+        <p:nvSpPr>
           <p:cNvPr id="4" name="Title 3">
             <a:extLst>
               <a:ext uri="{FF2B5EF4-FFF2-40B4-BE49-F238E27FC236}">
@@ -15569,8 +15881,8 @@
         </p:nvSpPr>
         <p:spPr>
           <a:xfrm>
-            <a:off x="72473" y="4704825"/>
-            <a:ext cx="12116328" cy="768084"/>
+            <a:off x="615109" y="4704825"/>
+            <a:ext cx="10961783" cy="768084"/>
           </a:xfrm>
         </p:spPr>
         <p:txBody>
@@ -15578,11 +15890,10 @@
           <a:lstStyle/>
           <a:p>
             <a:r>
-              <a:rPr lang="en-US" sz="5350" dirty="0">
-                <a:cs typeface="Arial"/>
-              </a:rPr>
-              <a:t>Използване на ключовата дума "Throw"</a:t>
-            </a:r>
+              <a:rPr lang="bg-BG" dirty="0"/>
+              <a:t>Хвърляне на грешки</a:t>
+            </a:r>
+            <a:endParaRPr lang="en-US" dirty="0"/>
           </a:p>
         </p:txBody>
       </p:sp>
@@ -15634,7 +15945,12 @@
             <p:ph type="body" sz="quarter" idx="10"/>
           </p:nvPr>
         </p:nvSpPr>
-        <p:spPr/>
+        <p:spPr>
+          <a:xfrm>
+            <a:off x="190402" y="1134000"/>
+            <a:ext cx="11818096" cy="5528766"/>
+          </a:xfrm>
+        </p:spPr>
         <p:txBody>
           <a:bodyPr vert="horz" lIns="108000" tIns="36000" rIns="108000" bIns="36000" rtlCol="0" anchor="t">
             <a:noAutofit/>
@@ -15653,18 +15969,42 @@
               </a:buClr>
             </a:pPr>
             <a:r>
-              <a:rPr lang="en-US" sz="3400" b="1" dirty="0">
+              <a:rPr lang="bg-BG" sz="3200" b="1" dirty="0">
                 <a:solidFill>
                   <a:schemeClr val="bg1"/>
                 </a:solidFill>
               </a:rPr>
-              <a:t>Хвърляме exception </a:t>
-            </a:r>
-            <a:r>
-              <a:rPr lang="en-US" sz="3400" dirty="0"/>
-              <a:t>със съобщение с грешка:</a:t>
-            </a:r>
-            <a:endParaRPr lang="en-US" sz="3400" dirty="0">
+              <a:t>Хвърляме</a:t>
+            </a:r>
+            <a:r>
+              <a:rPr lang="en-US" sz="3200" b="1" dirty="0">
+                <a:solidFill>
+                  <a:schemeClr val="bg1"/>
+                </a:solidFill>
+              </a:rPr>
+              <a:t> </a:t>
+            </a:r>
+            <a:r>
+              <a:rPr lang="bg-BG" sz="3200" b="1" dirty="0">
+                <a:solidFill>
+                  <a:schemeClr val="bg1"/>
+                </a:solidFill>
+              </a:rPr>
+              <a:t>изключение</a:t>
+            </a:r>
+            <a:r>
+              <a:rPr lang="en-US" sz="3200" b="1" dirty="0">
+                <a:solidFill>
+                  <a:schemeClr val="bg1"/>
+                </a:solidFill>
+              </a:rPr>
+              <a:t> </a:t>
+            </a:r>
+            <a:r>
+              <a:rPr lang="en-US" sz="3200" dirty="0"/>
+              <a:t>със съобщение:</a:t>
+            </a:r>
+            <a:endParaRPr lang="en-US" sz="3200" dirty="0">
               <a:cs typeface="Calibri"/>
             </a:endParaRPr>
           </a:p>
@@ -15690,11 +16030,15 @@
               </a:spcBef>
             </a:pPr>
             <a:r>
-              <a:rPr lang="en-US" sz="3400" dirty="0"/>
-              <a:t>Exceptions може да приема </a:t>
-            </a:r>
-            <a:r>
-              <a:rPr lang="en-US" sz="3400" b="1" dirty="0">
+              <a:rPr lang="bg-BG" sz="3200" dirty="0"/>
+              <a:t>Изключението</a:t>
+            </a:r>
+            <a:r>
+              <a:rPr lang="en-US" sz="3200" dirty="0"/>
+              <a:t> може да приема </a:t>
+            </a:r>
+            <a:r>
+              <a:rPr lang="en-US" sz="3200" b="1" dirty="0">
                 <a:solidFill>
                   <a:schemeClr val="bg1"/>
                 </a:solidFill>
@@ -15702,22 +16046,30 @@
               <a:t>съобщение </a:t>
             </a:r>
             <a:r>
-              <a:rPr lang="en-US" sz="3400" dirty="0"/>
+              <a:rPr lang="en-US" sz="3200" dirty="0"/>
               <a:t>+</a:t>
             </a:r>
             <a:r>
-              <a:rPr lang="en-US" sz="3400" b="1" dirty="0">
+              <a:rPr lang="en-US" sz="3200" b="1" dirty="0">
                 <a:solidFill>
                   <a:schemeClr val="bg1"/>
                 </a:solidFill>
               </a:rPr>
-              <a:t> exception </a:t>
-            </a:r>
-            <a:r>
-              <a:rPr lang="en-US" sz="3400" dirty="0"/>
+              <a:t> </a:t>
+            </a:r>
+            <a:r>
+              <a:rPr lang="bg-BG" sz="3200" b="1" dirty="0">
+                <a:solidFill>
+                  <a:schemeClr val="bg1"/>
+                </a:solidFill>
+              </a:rPr>
+              <a:t>друго изключение </a:t>
+            </a:r>
+            <a:r>
+              <a:rPr lang="bg-BG" sz="3200" dirty="0"/>
               <a:t>(причина):</a:t>
             </a:r>
-            <a:endParaRPr lang="en-US" sz="3400" dirty="0">
+            <a:endParaRPr lang="en-US" sz="3200" dirty="0">
               <a:cs typeface="Calibri"/>
             </a:endParaRPr>
           </a:p>
@@ -15769,7 +16121,7 @@
                 <a:spcPts val="0"/>
               </a:spcBef>
             </a:pPr>
-            <a:endParaRPr lang="en-US" sz="3400" dirty="0">
+            <a:endParaRPr lang="en-US" sz="1800" dirty="0">
               <a:cs typeface="Calibri"/>
             </a:endParaRPr>
           </a:p>
@@ -15779,42 +16131,32 @@
                 <a:spcPct val="100000"/>
               </a:lnSpc>
               <a:spcBef>
-                <a:spcPts val="0"/>
-              </a:spcBef>
-            </a:pPr>
-            <a:endParaRPr lang="en-US" sz="1800" dirty="0">
-              <a:cs typeface="Calibri"/>
-            </a:endParaRPr>
-          </a:p>
-          <a:p>
-            <a:pPr marL="360045" indent="-360045">
-              <a:lnSpc>
-                <a:spcPct val="100000"/>
-              </a:lnSpc>
-              <a:spcBef>
-                <a:spcPts val="0"/>
+                <a:spcPts val="4000"/>
               </a:spcBef>
               <a:buClr>
                 <a:schemeClr val="tx1"/>
               </a:buClr>
             </a:pPr>
             <a:r>
-              <a:rPr lang="en-US" sz="3400" dirty="0"/>
-              <a:t>Нарича се "</a:t>
-            </a:r>
-            <a:r>
-              <a:rPr lang="en-US" sz="3400" b="1" dirty="0">
+              <a:rPr lang="en-US" sz="3200" dirty="0"/>
+              <a:t>Нарича се</a:t>
+            </a:r>
+            <a:r>
+              <a:rPr lang="bg-BG" sz="3200" dirty="0"/>
+              <a:t> </a:t>
+            </a:r>
+            <a:r>
+              <a:rPr lang="bg-BG" sz="3200" b="1" dirty="0">
                 <a:solidFill>
                   <a:schemeClr val="bg1"/>
                 </a:solidFill>
               </a:rPr>
-              <a:t>chaining</a:t>
-            </a:r>
-            <a:r>
-              <a:rPr lang="en-US" sz="3400" dirty="0"/>
-              <a:t>" exceptions</a:t>
-            </a:r>
-            <a:endParaRPr lang="bg-BG" sz="3400" dirty="0">
+              <a:t>верига от изключения</a:t>
+            </a:r>
+            <a:endParaRPr lang="bg-BG" sz="3200" dirty="0">
+              <a:solidFill>
+                <a:schemeClr val="bg1"/>
+              </a:solidFill>
               <a:cs typeface="Calibri"/>
             </a:endParaRPr>
           </a:p>
@@ -15855,7 +16197,7 @@
         </p:nvSpPr>
         <p:spPr bwMode="auto">
           <a:xfrm>
-            <a:off x="695400" y="1810945"/>
+            <a:off x="695400" y="1674000"/>
             <a:ext cx="10512862" cy="605245"/>
           </a:xfrm>
           <a:prstGeom prst="rect">
@@ -15916,7 +16258,7 @@
         </p:nvSpPr>
         <p:spPr bwMode="auto">
           <a:xfrm>
-            <a:off x="695400" y="3522441"/>
+            <a:off x="695400" y="3339000"/>
             <a:ext cx="10512862" cy="2541489"/>
           </a:xfrm>
           <a:prstGeom prst="rect">
@@ -16203,7 +16545,7 @@
                                         <p:tgtEl>
                                           <p:spTgt spid="564227">
                                             <p:txEl>
-                                              <p:pRg st="8" end="8"/>
+                                              <p:pRg st="7" end="7"/>
                                             </p:txEl>
                                           </p:spTgt>
                                         </p:tgtEl>
@@ -16279,7 +16621,12 @@
             <p:ph type="body" sz="quarter" idx="10"/>
           </p:nvPr>
         </p:nvSpPr>
-        <p:spPr/>
+        <p:spPr>
+          <a:xfrm>
+            <a:off x="111000" y="1196125"/>
+            <a:ext cx="12001598" cy="5528766"/>
+          </a:xfrm>
+        </p:spPr>
         <p:txBody>
           <a:bodyPr vert="horz" lIns="108000" tIns="36000" rIns="108000" bIns="36000" rtlCol="0" anchor="t">
             <a:normAutofit/>
@@ -16295,11 +16642,23 @@
               </a:spcBef>
             </a:pPr>
             <a:r>
-              <a:rPr lang="en-US" sz="3550" dirty="0"/>
-              <a:t>Exceptions се хвърля(raised) чрез ключовата дума</a:t>
-            </a:r>
-            <a:r>
-              <a:rPr lang="en-US" sz="3550" dirty="0">
+              <a:rPr lang="bg-BG" sz="3400" dirty="0"/>
+              <a:t>Изключение</a:t>
+            </a:r>
+            <a:r>
+              <a:rPr lang="en-US" sz="3400" dirty="0"/>
+              <a:t> се хвърля</a:t>
+            </a:r>
+            <a:r>
+              <a:rPr lang="bg-BG" sz="3400" dirty="0"/>
+              <a:t> </a:t>
+            </a:r>
+            <a:r>
+              <a:rPr lang="en-US" sz="3400" dirty="0"/>
+              <a:t>чрез ключовата дума</a:t>
+            </a:r>
+            <a:r>
+              <a:rPr lang="en-US" sz="3400" dirty="0">
                 <a:solidFill>
                   <a:srgbClr val="234465"/>
                 </a:solidFill>
@@ -16309,7 +16668,7 @@
               <a:t> </a:t>
             </a:r>
             <a:r>
-              <a:rPr lang="en-US" sz="3550" b="1" dirty="0">
+              <a:rPr lang="en-US" sz="3400" b="1" dirty="0">
                 <a:solidFill>
                   <a:schemeClr val="bg1"/>
                 </a:solidFill>
@@ -16319,7 +16678,7 @@
               <a:t>throw</a:t>
             </a:r>
             <a:r>
-              <a:rPr lang="en-US" sz="3550" dirty="0">
+              <a:rPr lang="en-US" sz="3400" dirty="0">
                 <a:solidFill>
                   <a:schemeClr val="tx2">
                     <a:lumMod val="75000"/>
@@ -16328,7 +16687,7 @@
               </a:rPr>
               <a:t> </a:t>
             </a:r>
-            <a:endParaRPr lang="en-US" sz="3550" dirty="0">
+            <a:endParaRPr lang="en-US" sz="3400" dirty="0">
               <a:solidFill>
                 <a:schemeClr val="tx2">
                   <a:lumMod val="75000"/>
@@ -16347,10 +16706,10 @@
               </a:spcBef>
             </a:pPr>
             <a:r>
-              <a:rPr lang="bg-BG" sz="3599" dirty="0"/>
-              <a:t>Известява че в кода има проблем</a:t>
-            </a:r>
-            <a:endParaRPr lang="en-US" sz="3599" dirty="0">
+              <a:rPr lang="bg-BG" sz="3400" dirty="0"/>
+              <a:t>Известява, че в кода има проблем</a:t>
+            </a:r>
+            <a:endParaRPr lang="en-US" sz="3400" dirty="0">
               <a:cs typeface="Calibri"/>
             </a:endParaRPr>
           </a:p>
@@ -16364,10 +16723,26 @@
               </a:spcBef>
             </a:pPr>
             <a:r>
-              <a:rPr lang="en-US" sz="3550" dirty="0"/>
-              <a:t>Когато се хвърли exception:</a:t>
-            </a:r>
-            <a:endParaRPr lang="en-US" sz="3550" dirty="0">
+              <a:rPr lang="en-US" sz="3400" dirty="0"/>
+              <a:t>Когато се </a:t>
+            </a:r>
+            <a:r>
+              <a:rPr lang="bg-BG" sz="3400" dirty="0"/>
+              <a:t>хвърли</a:t>
+            </a:r>
+            <a:r>
+              <a:rPr lang="en-US" sz="3400" dirty="0"/>
+              <a:t> </a:t>
+            </a:r>
+            <a:r>
+              <a:rPr lang="bg-BG" sz="3400" dirty="0"/>
+              <a:t>изключение</a:t>
+            </a:r>
+            <a:r>
+              <a:rPr lang="en-US" sz="3400" dirty="0"/>
+              <a:t>:</a:t>
+            </a:r>
+            <a:endParaRPr lang="en-US" sz="3400" dirty="0">
               <a:cs typeface="Calibri"/>
             </a:endParaRPr>
           </a:p>
@@ -16381,10 +16756,21 @@
               </a:spcBef>
             </a:pPr>
             <a:r>
-              <a:rPr lang="en-US" sz="3350" dirty="0"/>
-              <a:t>Програмата спира</a:t>
-            </a:r>
-            <a:endParaRPr lang="en-US" sz="3399" dirty="0">
+              <a:rPr lang="en-US" sz="3200" dirty="0"/>
+              <a:t>Програмата </a:t>
+            </a:r>
+            <a:r>
+              <a:rPr lang="en-US" sz="3200" b="1" dirty="0">
+                <a:solidFill>
+                  <a:schemeClr val="bg1"/>
+                </a:solidFill>
+              </a:rPr>
+              <a:t>спира</a:t>
+            </a:r>
+            <a:endParaRPr lang="en-US" sz="3200" b="1" dirty="0">
+              <a:solidFill>
+                <a:schemeClr val="bg1"/>
+              </a:solidFill>
               <a:cs typeface="Calibri"/>
             </a:endParaRPr>
           </a:p>
@@ -16398,30 +16784,62 @@
               </a:spcBef>
             </a:pPr>
             <a:r>
-              <a:rPr lang="en-US" sz="3350" dirty="0"/>
-              <a:t>Exception-a преминава през стака</a:t>
-            </a:r>
-            <a:endParaRPr lang="en-US" sz="3350" dirty="0">
-              <a:cs typeface="Calibri"/>
-            </a:endParaRPr>
-          </a:p>
-          <a:p>
-            <a:pPr marL="1255395" lvl="2" indent="-360045">
-              <a:lnSpc>
-                <a:spcPct val="100000"/>
-              </a:lnSpc>
-              <a:spcBef>
-                <a:spcPts val="1200"/>
-              </a:spcBef>
-            </a:pPr>
-            <a:r>
-              <a:rPr lang="en-US" sz="3150" dirty="0">
+              <a:rPr lang="bg-BG" sz="3200" dirty="0"/>
+              <a:t>Изключението</a:t>
+            </a:r>
+            <a:r>
+              <a:rPr lang="en-US" sz="3200" dirty="0"/>
+              <a:t> преминава през </a:t>
+            </a:r>
+            <a:r>
+              <a:rPr lang="bg-BG" sz="3200" b="1" dirty="0">
+                <a:solidFill>
+                  <a:schemeClr val="bg1"/>
+                </a:solidFill>
+              </a:rPr>
+              <a:t>стека</a:t>
+            </a:r>
+            <a:r>
+              <a:rPr lang="bg-BG" sz="3200" b="1" dirty="0">
+                <a:solidFill>
+                  <a:schemeClr val="bg1"/>
+                </a:solidFill>
                 <a:cs typeface="Calibri"/>
               </a:rPr>
-              <a:t>Докато достигне до негови блок </a:t>
-            </a:r>
-            <a:r>
-              <a:rPr lang="en-US" sz="3150" b="1" dirty="0">
+              <a:t> </a:t>
+            </a:r>
+            <a:r>
+              <a:rPr lang="bg-BG" sz="3200" dirty="0" err="1">
+                <a:cs typeface="Calibri"/>
+              </a:rPr>
+              <a:t>д</a:t>
+            </a:r>
+            <a:r>
+              <a:rPr lang="en-US" sz="3200" dirty="0" err="1">
+                <a:cs typeface="Calibri"/>
+              </a:rPr>
+              <a:t>окато</a:t>
+            </a:r>
+            <a:r>
+              <a:rPr lang="en-US" sz="3200" dirty="0">
+                <a:cs typeface="Calibri"/>
+              </a:rPr>
+              <a:t> достигне до блок</a:t>
+            </a:r>
+            <a:r>
+              <a:rPr lang="bg-BG" sz="3200" dirty="0">
+                <a:cs typeface="Calibri"/>
+              </a:rPr>
+              <a:t>а</a:t>
+            </a:r>
+            <a:r>
+              <a:rPr lang="en-US" sz="3200" dirty="0">
+                <a:cs typeface="Calibri"/>
+              </a:rPr>
+              <a:t> </a:t>
+            </a:r>
+            <a:r>
+              <a:rPr lang="en-US" sz="3200" b="1" dirty="0">
                 <a:solidFill>
                   <a:schemeClr val="bg1"/>
                 </a:solidFill>
@@ -16431,7 +16849,7 @@
               <a:t>catch</a:t>
             </a:r>
             <a:r>
-              <a:rPr lang="en-US" sz="3150" dirty="0">
+              <a:rPr lang="en-US" sz="3200" dirty="0">
                 <a:solidFill>
                   <a:schemeClr val="tx2">
                     <a:lumMod val="75000"/>
@@ -16442,7 +16860,7 @@
               </a:rPr>
               <a:t> </a:t>
             </a:r>
-            <a:endParaRPr lang="en-US" sz="3150" dirty="0">
+            <a:endParaRPr lang="en-US" sz="3200" dirty="0">
               <a:solidFill>
                 <a:schemeClr val="tx2">
                   <a:lumMod val="75000"/>
@@ -16460,10 +16878,26 @@
               </a:spcBef>
             </a:pPr>
             <a:r>
-              <a:rPr lang="en-US" sz="3350" dirty="0"/>
-              <a:t>Не хванат exceptions изписва съобщение за грешка</a:t>
-            </a:r>
-            <a:endParaRPr lang="en-US" sz="3350" dirty="0">
+              <a:rPr lang="bg-BG" sz="3400" dirty="0"/>
+              <a:t>При </a:t>
+            </a:r>
+            <a:r>
+              <a:rPr lang="bg-BG" sz="3400" b="1" dirty="0">
+                <a:solidFill>
+                  <a:schemeClr val="bg1"/>
+                </a:solidFill>
+              </a:rPr>
+              <a:t>нехванато изключение</a:t>
+            </a:r>
+            <a:r>
+              <a:rPr lang="bg-BG" sz="3400" dirty="0"/>
+              <a:t>, се </a:t>
+            </a:r>
+            <a:r>
+              <a:rPr lang="en-US" sz="3400" dirty="0"/>
+              <a:t>изписва съобщение за грешка</a:t>
+            </a:r>
+            <a:endParaRPr lang="en-US" sz="3400" dirty="0">
               <a:cs typeface="Calibri"/>
             </a:endParaRPr>
           </a:p>
@@ -16486,7 +16920,11 @@
           <a:p>
             <a:r>
               <a:rPr lang="en-US" sz="3950" dirty="0"/>
-              <a:t>Хвърляне на exceptions</a:t>
+              <a:t>Хвърляне на </a:t>
+            </a:r>
+            <a:r>
+              <a:rPr lang="bg-BG" sz="3950" dirty="0"/>
+              <a:t>изключения</a:t>
             </a:r>
             <a:endParaRPr lang="bg-BG" dirty="0"/>
           </a:p>
@@ -16652,33 +17090,15 @@
                                   </p:childTnLst>
                                 </p:cTn>
                               </p:par>
-                            </p:childTnLst>
-                          </p:cTn>
-                        </p:par>
-                      </p:childTnLst>
-                    </p:cTn>
-                  </p:par>
-                  <p:par>
-                    <p:cTn id="11" fill="hold">
-                      <p:stCondLst>
-                        <p:cond delay="indefinite"/>
-                      </p:stCondLst>
-                      <p:childTnLst>
-                        <p:par>
-                          <p:cTn id="12" fill="hold">
-                            <p:stCondLst>
-                              <p:cond delay="0"/>
-                            </p:stCondLst>
-                            <p:childTnLst>
                               <p:par>
-                                <p:cTn id="13" presetID="1" presetClass="entr" presetSubtype="0" fill="hold" nodeType="clickEffect">
+                                <p:cTn id="11" presetID="1" presetClass="entr" presetSubtype="0" fill="hold" nodeType="withEffect">
                                   <p:stCondLst>
                                     <p:cond delay="0"/>
                                   </p:stCondLst>
                                   <p:childTnLst>
                                     <p:set>
                                       <p:cBhvr>
-                                        <p:cTn id="14" dur="1" fill="hold">
+                                        <p:cTn id="12" dur="1" fill="hold">
                                           <p:stCondLst>
                                             <p:cond delay="0"/>
                                           </p:stCondLst>
@@ -16708,26 +17128,26 @@
                     </p:cTn>
                   </p:par>
                   <p:par>
-                    <p:cTn id="15" fill="hold">
+                    <p:cTn id="13" fill="hold">
                       <p:stCondLst>
                         <p:cond delay="indefinite"/>
                       </p:stCondLst>
                       <p:childTnLst>
                         <p:par>
-                          <p:cTn id="16" fill="hold">
+                          <p:cTn id="14" fill="hold">
                             <p:stCondLst>
                               <p:cond delay="0"/>
                             </p:stCondLst>
                             <p:childTnLst>
                               <p:par>
-                                <p:cTn id="17" presetID="1" presetClass="entr" presetSubtype="0" fill="hold" nodeType="clickEffect">
+                                <p:cTn id="15" presetID="1" presetClass="entr" presetSubtype="0" fill="hold" nodeType="clickEffect">
                                   <p:stCondLst>
                                     <p:cond delay="0"/>
                                   </p:stCondLst>
                                   <p:childTnLst>
                                     <p:set>
                                       <p:cBhvr>
-                                        <p:cTn id="18" dur="1" fill="hold">
+                                        <p:cTn id="16" dur="1" fill="hold">
                                           <p:stCondLst>
                                             <p:cond delay="0"/>
                                           </p:stCondLst>
@@ -16750,8 +17170,26 @@
                                   </p:childTnLst>
                                 </p:cTn>
                               </p:par>
+                            </p:childTnLst>
+                          </p:cTn>
+                        </p:par>
+                      </p:childTnLst>
+                    </p:cTn>
+                  </p:par>
+                  <p:par>
+                    <p:cTn id="17" fill="hold">
+                      <p:stCondLst>
+                        <p:cond delay="indefinite"/>
+                      </p:stCondLst>
+                      <p:childTnLst>
+                        <p:par>
+                          <p:cTn id="18" fill="hold">
+                            <p:stCondLst>
+                              <p:cond delay="0"/>
+                            </p:stCondLst>
+                            <p:childTnLst>
                               <p:par>
-                                <p:cTn id="19" presetID="1" presetClass="entr" presetSubtype="0" fill="hold" nodeType="withEffect">
+                                <p:cTn id="19" presetID="1" presetClass="entr" presetSubtype="0" fill="hold" nodeType="clickEffect">
                                   <p:stCondLst>
                                     <p:cond delay="0"/>
                                   </p:stCondLst>
@@ -16767,55 +17205,6 @@
                                           <p:spTgt spid="562179">
                                             <p:txEl>
                                               <p:pRg st="5" end="5"/>
-                                            </p:txEl>
-                                          </p:spTgt>
-                                        </p:tgtEl>
-                                        <p:attrNameLst>
-                                          <p:attrName>style.visibility</p:attrName>
-                                        </p:attrNameLst>
-                                      </p:cBhvr>
-                                      <p:to>
-                                        <p:strVal val="visible"/>
-                                      </p:to>
-                                    </p:set>
-                                  </p:childTnLst>
-                                </p:cTn>
-                              </p:par>
-                            </p:childTnLst>
-                          </p:cTn>
-                        </p:par>
-                      </p:childTnLst>
-                    </p:cTn>
-                  </p:par>
-                  <p:par>
-                    <p:cTn id="21" fill="hold">
-                      <p:stCondLst>
-                        <p:cond delay="indefinite"/>
-                      </p:stCondLst>
-                      <p:childTnLst>
-                        <p:par>
-                          <p:cTn id="22" fill="hold">
-                            <p:stCondLst>
-                              <p:cond delay="0"/>
-                            </p:stCondLst>
-                            <p:childTnLst>
-                              <p:par>
-                                <p:cTn id="23" presetID="1" presetClass="entr" presetSubtype="0" fill="hold" nodeType="clickEffect">
-                                  <p:stCondLst>
-                                    <p:cond delay="0"/>
-                                  </p:stCondLst>
-                                  <p:childTnLst>
-                                    <p:set>
-                                      <p:cBhvr>
-                                        <p:cTn id="24" dur="1" fill="hold">
-                                          <p:stCondLst>
-                                            <p:cond delay="0"/>
-                                          </p:stCondLst>
-                                        </p:cTn>
-                                        <p:tgtEl>
-                                          <p:spTgt spid="562179">
-                                            <p:txEl>
-                                              <p:pRg st="6" end="6"/>
                                             </p:txEl>
                                           </p:spTgt>
                                         </p:tgtEl>
@@ -16906,11 +17295,18 @@
               </a:lnSpc>
             </a:pPr>
             <a:r>
+              <a:rPr lang="bg-BG" sz="3600" dirty="0">
+                <a:ea typeface="+mn-lt"/>
+                <a:cs typeface="+mn-lt"/>
+              </a:rPr>
+              <a:t>Изключенията</a:t>
+            </a:r>
+            <a:r>
               <a:rPr lang="en-US" sz="3600" dirty="0">
                 <a:ea typeface="+mn-lt"/>
                 <a:cs typeface="+mn-lt"/>
               </a:rPr>
-              <a:t>Exception-ите могат да се </a:t>
+              <a:t> могат да се </a:t>
             </a:r>
             <a:r>
               <a:rPr lang="en-US" sz="3600" b="1" dirty="0">
@@ -16942,18 +17338,15 @@
         </p:nvSpPr>
         <p:spPr/>
         <p:txBody>
-          <a:bodyPr/>
+          <a:bodyPr>
+            <a:normAutofit fontScale="90000"/>
+          </a:bodyPr>
           <a:lstStyle/>
           <a:p>
             <a:r>
               <a:rPr lang="bg-BG" dirty="0"/>
-              <a:t>Преизползване на хвърляне на</a:t>
-            </a:r>
-            <a:r>
-              <a:rPr lang="en-US" dirty="0"/>
-              <a:t> exception</a:t>
-            </a:r>
-            <a:endParaRPr lang="bg-BG" dirty="0"/>
+              <a:t>Преизползване на хвърляне на изключение</a:t>
+            </a:r>
           </a:p>
         </p:txBody>
       </p:sp>
@@ -17414,8 +17807,8 @@
               <a:buAutoNum type="arabicPeriod"/>
             </a:pPr>
             <a:r>
-              <a:rPr lang="en-US" dirty="0"/>
-              <a:t>Какво е еxceptions?</a:t>
+              <a:rPr lang="bg-BG" dirty="0"/>
+              <a:t>Изключения</a:t>
             </a:r>
             <a:endParaRPr lang="bg-BG" dirty="0">
               <a:cs typeface="Calibri"/>
@@ -17429,7 +17822,15 @@
             </a:pPr>
             <a:r>
               <a:rPr lang="en-US" dirty="0"/>
-              <a:t>Класа </a:t>
+              <a:t>Клас</a:t>
+            </a:r>
+            <a:r>
+              <a:rPr lang="bg-BG" dirty="0"/>
+              <a:t>ът</a:t>
+            </a:r>
+            <a:r>
+              <a:rPr lang="en-US" dirty="0"/>
+              <a:t> </a:t>
             </a:r>
             <a:r>
               <a:rPr lang="en-US" b="1" noProof="1">
@@ -17453,10 +17854,29 @@
               <a:lnSpc>
                 <a:spcPct val="100000"/>
               </a:lnSpc>
+              <a:buClr>
+                <a:schemeClr val="tx1"/>
+              </a:buClr>
             </a:pPr>
             <a:r>
+              <a:rPr lang="bg-BG" b="1" dirty="0">
+                <a:solidFill>
+                  <a:schemeClr val="bg1"/>
+                </a:solidFill>
+              </a:rPr>
+              <a:t>Видове</a:t>
+            </a:r>
+            <a:r>
               <a:rPr lang="en-US" dirty="0"/>
-              <a:t>Видове Exceptions и тяхната </a:t>
+              <a:t> </a:t>
+            </a:r>
+            <a:r>
+              <a:rPr lang="bg-BG" dirty="0"/>
+              <a:t>изключения</a:t>
+            </a:r>
+            <a:r>
+              <a:rPr lang="en-US" dirty="0"/>
+              <a:t> и тяхната </a:t>
             </a:r>
             <a:r>
               <a:rPr lang="en-US" dirty="0">
@@ -17479,7 +17899,11 @@
             </a:pPr>
             <a:r>
               <a:rPr lang="en-US" dirty="0"/>
-              <a:t>Хващане на exceptions</a:t>
+              <a:t>Хващане на </a:t>
+            </a:r>
+            <a:r>
+              <a:rPr lang="bg-BG" dirty="0"/>
+              <a:t>изключения</a:t>
             </a:r>
             <a:endParaRPr lang="en-US" dirty="0">
               <a:cs typeface="Calibri"/>
@@ -17519,20 +17943,20 @@
               <a:buAutoNum type="arabicPeriod"/>
             </a:pPr>
             <a:r>
+              <a:rPr lang="bg-BG" dirty="0"/>
+              <a:t>Хвърляне </a:t>
+            </a:r>
+            <a:r>
               <a:rPr lang="ru-RU" dirty="0"/>
-              <a:t>Покачване (</a:t>
+              <a:t>на</a:t>
             </a:r>
             <a:r>
               <a:rPr lang="en-US" dirty="0"/>
-              <a:t>хвърляне</a:t>
-            </a:r>
-            <a:r>
-              <a:rPr lang="ru-RU" dirty="0"/>
-              <a:t>) на</a:t>
-            </a:r>
-            <a:r>
-              <a:rPr lang="en-US" dirty="0"/>
-              <a:t> exception</a:t>
+              <a:t> </a:t>
+            </a:r>
+            <a:r>
+              <a:rPr lang="bg-BG" dirty="0"/>
+              <a:t>изключения</a:t>
             </a:r>
             <a:endParaRPr lang="en-US" dirty="0">
               <a:cs typeface="Calibri"/>
@@ -17572,8 +17996,8 @@
               <a:buAutoNum type="arabicPeriod"/>
             </a:pPr>
             <a:r>
-              <a:rPr lang="en-US" dirty="0"/>
-              <a:t>Exception: Добра практика</a:t>
+              <a:rPr lang="bg-BG" dirty="0"/>
+              <a:t>Утвърдени практики при изключенията</a:t>
             </a:r>
             <a:endParaRPr lang="en-US" dirty="0">
               <a:cs typeface="Calibri"/>
@@ -17797,7 +18221,7 @@
                                         <p:tgtEl>
                                           <p:spTgt spid="3">
                                             <p:txEl>
-                                              <p:pRg st="1" end="1"/>
+                                              <p:pRg st="2" end="2"/>
                                             </p:txEl>
                                           </p:spTgt>
                                         </p:tgtEl>
@@ -17846,7 +18270,38 @@
                                         <p:tgtEl>
                                           <p:spTgt spid="3">
                                             <p:txEl>
-                                              <p:pRg st="2" end="2"/>
+                                              <p:pRg st="3" end="3"/>
+                                            </p:txEl>
+                                          </p:spTgt>
+                                        </p:tgtEl>
+                                        <p:attrNameLst>
+                                          <p:attrName>style.visibility</p:attrName>
+                                        </p:attrNameLst>
+                                      </p:cBhvr>
+                                      <p:to>
+                                        <p:strVal val="visible"/>
+                                      </p:to>
+                                    </p:set>
+                                  </p:childTnLst>
+                                </p:cTn>
+                              </p:par>
+                              <p:par>
+                                <p:cTn id="11" presetID="1" presetClass="entr" presetSubtype="0" fill="hold" nodeType="withEffect">
+                                  <p:stCondLst>
+                                    <p:cond delay="0"/>
+                                  </p:stCondLst>
+                                  <p:childTnLst>
+                                    <p:set>
+                                      <p:cBhvr>
+                                        <p:cTn id="12" dur="1" fill="hold">
+                                          <p:stCondLst>
+                                            <p:cond delay="0"/>
+                                          </p:stCondLst>
+                                        </p:cTn>
+                                        <p:tgtEl>
+                                          <p:spTgt spid="3">
+                                            <p:txEl>
+                                              <p:pRg st="4" end="4"/>
                                             </p:txEl>
                                           </p:spTgt>
                                         </p:tgtEl>
@@ -17868,26 +18323,26 @@
                     </p:cTn>
                   </p:par>
                   <p:par>
-                    <p:cTn id="11" fill="hold">
+                    <p:cTn id="13" fill="hold">
                       <p:stCondLst>
                         <p:cond delay="indefinite"/>
                       </p:stCondLst>
                       <p:childTnLst>
                         <p:par>
-                          <p:cTn id="12" fill="hold">
+                          <p:cTn id="14" fill="hold">
                             <p:stCondLst>
                               <p:cond delay="0"/>
                             </p:stCondLst>
                             <p:childTnLst>
                               <p:par>
-                                <p:cTn id="13" presetID="1" presetClass="entr" presetSubtype="0" fill="hold" nodeType="clickEffect">
+                                <p:cTn id="15" presetID="1" presetClass="entr" presetSubtype="0" fill="hold" nodeType="clickEffect">
                                   <p:stCondLst>
                                     <p:cond delay="0"/>
                                   </p:stCondLst>
                                   <p:childTnLst>
                                     <p:set>
                                       <p:cBhvr>
-                                        <p:cTn id="14" dur="1" fill="hold">
+                                        <p:cTn id="16" dur="1" fill="hold">
                                           <p:stCondLst>
                                             <p:cond delay="0"/>
                                           </p:stCondLst>
@@ -17895,7 +18350,7 @@
                                         <p:tgtEl>
                                           <p:spTgt spid="3">
                                             <p:txEl>
-                                              <p:pRg st="3" end="3"/>
+                                              <p:pRg st="5" end="5"/>
                                             </p:txEl>
                                           </p:spTgt>
                                         </p:tgtEl>
@@ -17910,26 +18365,8 @@
                                   </p:childTnLst>
                                 </p:cTn>
                               </p:par>
-                            </p:childTnLst>
-                          </p:cTn>
-                        </p:par>
-                      </p:childTnLst>
-                    </p:cTn>
-                  </p:par>
-                  <p:par>
-                    <p:cTn id="15" fill="hold">
-                      <p:stCondLst>
-                        <p:cond delay="indefinite"/>
-                      </p:stCondLst>
-                      <p:childTnLst>
-                        <p:par>
-                          <p:cTn id="16" fill="hold">
-                            <p:stCondLst>
-                              <p:cond delay="0"/>
-                            </p:stCondLst>
-                            <p:childTnLst>
                               <p:par>
-                                <p:cTn id="17" presetID="1" presetClass="entr" presetSubtype="0" fill="hold" nodeType="clickEffect">
+                                <p:cTn id="17" presetID="1" presetClass="entr" presetSubtype="0" fill="hold" nodeType="withEffect">
                                   <p:stCondLst>
                                     <p:cond delay="0"/>
                                   </p:stCondLst>
@@ -17944,7 +18381,7 @@
                                         <p:tgtEl>
                                           <p:spTgt spid="3">
                                             <p:txEl>
-                                              <p:pRg st="4" end="4"/>
+                                              <p:pRg st="6" end="6"/>
                                             </p:txEl>
                                           </p:spTgt>
                                         </p:tgtEl>
@@ -17986,104 +18423,6 @@
                                     <p:set>
                                       <p:cBhvr>
                                         <p:cTn id="22" dur="1" fill="hold">
-                                          <p:stCondLst>
-                                            <p:cond delay="0"/>
-                                          </p:stCondLst>
-                                        </p:cTn>
-                                        <p:tgtEl>
-                                          <p:spTgt spid="3">
-                                            <p:txEl>
-                                              <p:pRg st="5" end="5"/>
-                                            </p:txEl>
-                                          </p:spTgt>
-                                        </p:tgtEl>
-                                        <p:attrNameLst>
-                                          <p:attrName>style.visibility</p:attrName>
-                                        </p:attrNameLst>
-                                      </p:cBhvr>
-                                      <p:to>
-                                        <p:strVal val="visible"/>
-                                      </p:to>
-                                    </p:set>
-                                  </p:childTnLst>
-                                </p:cTn>
-                              </p:par>
-                            </p:childTnLst>
-                          </p:cTn>
-                        </p:par>
-                      </p:childTnLst>
-                    </p:cTn>
-                  </p:par>
-                  <p:par>
-                    <p:cTn id="23" fill="hold">
-                      <p:stCondLst>
-                        <p:cond delay="indefinite"/>
-                      </p:stCondLst>
-                      <p:childTnLst>
-                        <p:par>
-                          <p:cTn id="24" fill="hold">
-                            <p:stCondLst>
-                              <p:cond delay="0"/>
-                            </p:stCondLst>
-                            <p:childTnLst>
-                              <p:par>
-                                <p:cTn id="25" presetID="1" presetClass="entr" presetSubtype="0" fill="hold" nodeType="clickEffect">
-                                  <p:stCondLst>
-                                    <p:cond delay="0"/>
-                                  </p:stCondLst>
-                                  <p:childTnLst>
-                                    <p:set>
-                                      <p:cBhvr>
-                                        <p:cTn id="26" dur="1" fill="hold">
-                                          <p:stCondLst>
-                                            <p:cond delay="0"/>
-                                          </p:stCondLst>
-                                        </p:cTn>
-                                        <p:tgtEl>
-                                          <p:spTgt spid="3">
-                                            <p:txEl>
-                                              <p:pRg st="6" end="6"/>
-                                            </p:txEl>
-                                          </p:spTgt>
-                                        </p:tgtEl>
-                                        <p:attrNameLst>
-                                          <p:attrName>style.visibility</p:attrName>
-                                        </p:attrNameLst>
-                                      </p:cBhvr>
-                                      <p:to>
-                                        <p:strVal val="visible"/>
-                                      </p:to>
-                                    </p:set>
-                                  </p:childTnLst>
-                                </p:cTn>
-                              </p:par>
-                            </p:childTnLst>
-                          </p:cTn>
-                        </p:par>
-                      </p:childTnLst>
-                    </p:cTn>
-                  </p:par>
-                  <p:par>
-                    <p:cTn id="27" fill="hold">
-                      <p:stCondLst>
-                        <p:cond delay="indefinite"/>
-                      </p:stCondLst>
-                      <p:childTnLst>
-                        <p:par>
-                          <p:cTn id="28" fill="hold">
-                            <p:stCondLst>
-                              <p:cond delay="0"/>
-                            </p:stCondLst>
-                            <p:childTnLst>
-                              <p:par>
-                                <p:cTn id="29" presetID="1" presetClass="entr" presetSubtype="0" fill="hold" nodeType="clickEffect">
-                                  <p:stCondLst>
-                                    <p:cond delay="0"/>
-                                  </p:stCondLst>
-                                  <p:childTnLst>
-                                    <p:set>
-                                      <p:cBhvr>
-                                        <p:cTn id="30" dur="1" fill="hold">
                                           <p:stCondLst>
                                             <p:cond delay="0"/>
                                           </p:stCondLst>
@@ -18171,7 +18510,15 @@
           <a:p>
             <a:r>
               <a:rPr lang="en-US" sz="3750" dirty="0"/>
-              <a:t>Хвърляне на exception-и – Примери</a:t>
+              <a:t>Хвърляне на </a:t>
+            </a:r>
+            <a:r>
+              <a:rPr lang="bg-BG" sz="3750" dirty="0"/>
+              <a:t>изключения</a:t>
+            </a:r>
+            <a:r>
+              <a:rPr lang="en-US" sz="3750" dirty="0"/>
+              <a:t> – Примери</a:t>
             </a:r>
             <a:endParaRPr lang="bg-BG" sz="3750" dirty="0"/>
           </a:p>
@@ -19047,8 +19394,8 @@
         </p:nvSpPr>
         <p:spPr>
           <a:xfrm>
-            <a:off x="3011" y="4704825"/>
-            <a:ext cx="12136012" cy="768084"/>
+            <a:off x="2577005" y="4689000"/>
+            <a:ext cx="7037989" cy="1784175"/>
           </a:xfrm>
         </p:spPr>
         <p:txBody>
@@ -19056,11 +19403,25 @@
           <a:lstStyle/>
           <a:p>
             <a:r>
-              <a:rPr lang="en-GB" sz="5350" dirty="0">
+              <a:rPr lang="bg-BG" sz="5350" dirty="0">
                 <a:cs typeface="Arial"/>
               </a:rPr>
-              <a:t>Най-добра практика за хващане на Exception </a:t>
-            </a:r>
+              <a:t>Утвърдени практики </a:t>
+            </a:r>
+            <a:br>
+              <a:rPr lang="bg-BG" sz="5350" dirty="0">
+                <a:cs typeface="Arial"/>
+              </a:rPr>
+            </a:br>
+            <a:r>
+              <a:rPr lang="bg-BG" sz="5350" dirty="0">
+                <a:cs typeface="Arial"/>
+              </a:rPr>
+              <a:t>при изключенията</a:t>
+            </a:r>
+            <a:endParaRPr lang="en-GB" sz="5350" dirty="0">
+              <a:cs typeface="Arial"/>
+            </a:endParaRPr>
           </a:p>
         </p:txBody>
       </p:sp>
@@ -19119,43 +19480,139 @@
           </a:bodyPr>
           <a:lstStyle/>
           <a:p>
+            <a:pPr indent="-360045">
+              <a:buClr>
+                <a:schemeClr val="tx1"/>
+              </a:buClr>
+            </a:pPr>
+            <a:r>
+              <a:rPr lang="bg-BG" sz="3400" dirty="0">
+                <a:ea typeface="+mn-lt"/>
+                <a:cs typeface="+mn-lt"/>
+              </a:rPr>
+              <a:t>Изключението</a:t>
+            </a:r>
+            <a:r>
+              <a:rPr lang="en-US" sz="3400" dirty="0">
+                <a:ea typeface="+mn-lt"/>
+                <a:cs typeface="+mn-lt"/>
+              </a:rPr>
+              <a:t> </a:t>
+            </a:r>
+            <a:r>
+              <a:rPr lang="en-US" sz="3400" dirty="0"/>
+              <a:t>трябва да бъде </a:t>
+            </a:r>
+            <a:r>
+              <a:rPr lang="en-US" sz="3400" b="1" dirty="0">
+                <a:solidFill>
+                  <a:schemeClr val="bg1"/>
+                </a:solidFill>
+              </a:rPr>
+              <a:t>най-долу в </a:t>
+            </a:r>
+            <a:r>
+              <a:rPr lang="en-US" sz="3400" b="1" dirty="0">
+                <a:solidFill>
+                  <a:schemeClr val="bg1"/>
+                </a:solidFill>
+                <a:ea typeface="+mn-lt"/>
+                <a:cs typeface="+mn-lt"/>
+              </a:rPr>
+              <a:t>йерархията</a:t>
+            </a:r>
+            <a:endParaRPr lang="en-US" sz="3400" b="1" dirty="0">
+              <a:solidFill>
+                <a:schemeClr val="bg1"/>
+              </a:solidFill>
+              <a:cs typeface="Calibri"/>
+            </a:endParaRPr>
+          </a:p>
+          <a:p>
+            <a:pPr lvl="1" indent="-360045">
+              <a:buClr>
+                <a:schemeClr val="tx1"/>
+              </a:buClr>
+            </a:pPr>
+            <a:r>
+              <a:rPr lang="en-US" sz="3200" dirty="0"/>
+              <a:t>В противен случай, ще възникне </a:t>
+            </a:r>
+            <a:r>
+              <a:rPr lang="en-US" sz="3200" b="1" dirty="0">
+                <a:solidFill>
+                  <a:schemeClr val="bg1"/>
+                </a:solidFill>
+              </a:rPr>
+              <a:t>грешка </a:t>
+            </a:r>
+            <a:r>
+              <a:rPr lang="bg-BG" sz="3200" b="1" dirty="0">
+                <a:solidFill>
+                  <a:schemeClr val="bg1"/>
+                </a:solidFill>
+              </a:rPr>
+              <a:t>при компилация</a:t>
+            </a:r>
+            <a:endParaRPr lang="en-US" sz="3200" b="1" dirty="0">
+              <a:solidFill>
+                <a:schemeClr val="bg1"/>
+              </a:solidFill>
+              <a:cs typeface="Calibri"/>
+            </a:endParaRPr>
+          </a:p>
+          <a:p>
             <a:pPr marL="360045" indent="-360045">
               <a:buClr>
                 <a:schemeClr val="tx1"/>
               </a:buClr>
             </a:pPr>
             <a:r>
-              <a:rPr lang="en-US" sz="3450" dirty="0">
-                <a:ea typeface="+mn-lt"/>
-                <a:cs typeface="+mn-lt"/>
-              </a:rPr>
-              <a:t>Блокът </a:t>
-            </a:r>
-            <a:r>
-              <a:rPr lang="en-US" sz="3450" b="1" dirty="0">
+              <a:rPr lang="en-US" sz="3400" dirty="0"/>
+              <a:t>Всеки </a:t>
+            </a:r>
+            <a:r>
+              <a:rPr lang="en-US" sz="3400" b="1" dirty="0">
                 <a:solidFill>
                   <a:schemeClr val="bg1"/>
                 </a:solidFill>
-                <a:ea typeface="+mn-lt"/>
-                <a:cs typeface="+mn-lt"/>
-              </a:rPr>
-              <a:t>Catch</a:t>
-            </a:r>
-            <a:r>
-              <a:rPr lang="en-US" sz="3450" dirty="0">
+                <a:latin typeface="Consolas"/>
+              </a:rPr>
+              <a:t>catch</a:t>
+            </a:r>
+            <a:r>
+              <a:rPr lang="en-US" sz="3400" dirty="0">
                 <a:solidFill>
                   <a:schemeClr val="tx2">
                     <a:lumMod val="75000"/>
                   </a:schemeClr>
                 </a:solidFill>
               </a:rPr>
-              <a:t> </a:t>
-            </a:r>
-            <a:r>
-              <a:rPr lang="en-US" sz="3450" dirty="0"/>
-              <a:t>трябва да: </a:t>
-            </a:r>
-            <a:endParaRPr lang="bg-BG" dirty="0"/>
+              <a:t> блок </a:t>
+            </a:r>
+            <a:r>
+              <a:rPr lang="en-US" sz="3400" dirty="0"/>
+              <a:t>трябва да хвърли </a:t>
+            </a:r>
+            <a:r>
+              <a:rPr lang="bg-BG" sz="3400" dirty="0"/>
+              <a:t>само</a:t>
+            </a:r>
+            <a:r>
+              <a:rPr lang="en-US" sz="3400" dirty="0"/>
+              <a:t> </a:t>
+            </a:r>
+            <a:r>
+              <a:rPr lang="bg-BG" sz="3400" dirty="0"/>
+              <a:t>изключения</a:t>
+            </a:r>
+            <a:r>
+              <a:rPr lang="en-US" sz="3400" dirty="0"/>
+              <a:t>, които се очакват </a:t>
+            </a:r>
+            <a:endParaRPr lang="en-US" sz="3400" dirty="0">
+              <a:cs typeface="Calibri"/>
+            </a:endParaRPr>
           </a:p>
           <a:p>
             <a:pPr lvl="1" indent="-360045">
@@ -19164,24 +19621,44 @@
               </a:buClr>
             </a:pPr>
             <a:r>
-              <a:rPr lang="en-US" sz="3150" dirty="0">
+              <a:rPr lang="en-US" sz="3200" dirty="0"/>
+              <a:t>Ако </a:t>
+            </a:r>
+            <a:r>
+              <a:rPr lang="bg-BG" sz="3200" dirty="0"/>
+              <a:t>методът </a:t>
+            </a:r>
+            <a:r>
+              <a:rPr lang="en-US" sz="3200" dirty="0"/>
+              <a:t>е </a:t>
+            </a:r>
+            <a:r>
+              <a:rPr lang="bg-BG" sz="3200" dirty="0"/>
+              <a:t>неспособен</a:t>
+            </a:r>
+            <a:r>
+              <a:rPr lang="en-US" sz="3200" dirty="0"/>
+              <a:t> </a:t>
+            </a:r>
+            <a:r>
+              <a:rPr lang="bg-BG" sz="3200" dirty="0"/>
+              <a:t>да хване </a:t>
+            </a:r>
+            <a:r>
+              <a:rPr lang="bg-BG" sz="3200" dirty="0">
                 <a:ea typeface="+mn-lt"/>
                 <a:cs typeface="+mn-lt"/>
               </a:rPr>
-              <a:t>Exception-a </a:t>
-            </a:r>
-            <a:r>
-              <a:rPr lang="en-US" sz="3150" dirty="0"/>
-              <a:t>трябва да бъде най-долу в </a:t>
-            </a:r>
-            <a:r>
-              <a:rPr lang="en-US" sz="3150" dirty="0">
+              <a:t>изключение</a:t>
+            </a:r>
+            <a:r>
+              <a:rPr lang="en-US" sz="3200" dirty="0">
                 <a:ea typeface="+mn-lt"/>
                 <a:cs typeface="+mn-lt"/>
               </a:rPr>
-              <a:t>йерархията</a:t>
-            </a:r>
-            <a:endParaRPr lang="en-US" sz="3150" dirty="0">
+              <a:t>, трябва да го оставите</a:t>
+            </a:r>
+            <a:endParaRPr lang="en-US" sz="3200" dirty="0">
               <a:cs typeface="Calibri"/>
             </a:endParaRPr>
           </a:p>
@@ -19192,90 +19669,25 @@
               </a:buClr>
             </a:pPr>
             <a:r>
-              <a:rPr lang="en-US" sz="3150" dirty="0"/>
-              <a:t>В противен случай, ще възникне грешка при компилацията</a:t>
-            </a:r>
-            <a:endParaRPr lang="en-US" sz="3150" dirty="0">
-              <a:cs typeface="Calibri"/>
-            </a:endParaRPr>
-          </a:p>
-          <a:p>
-            <a:pPr marL="360045" indent="-360045">
-              <a:buClr>
-                <a:schemeClr val="tx1"/>
-              </a:buClr>
-            </a:pPr>
-            <a:r>
-              <a:rPr lang="en-US" sz="3450" dirty="0"/>
-              <a:t>Всеки </a:t>
-            </a:r>
-            <a:r>
-              <a:rPr lang="en-US" sz="3450" b="1" dirty="0">
-                <a:solidFill>
-                  <a:schemeClr val="bg1"/>
-                </a:solidFill>
-                <a:latin typeface="Consolas"/>
-              </a:rPr>
-              <a:t>catch</a:t>
-            </a:r>
-            <a:r>
-              <a:rPr lang="en-US" sz="3450" dirty="0">
-                <a:solidFill>
-                  <a:schemeClr val="tx2">
-                    <a:lumMod val="75000"/>
-                  </a:schemeClr>
-                </a:solidFill>
-              </a:rPr>
-              <a:t> блок </a:t>
-            </a:r>
-            <a:r>
-              <a:rPr lang="en-US" sz="3450" dirty="0"/>
-              <a:t>трябва да хвърли само exceptions, които се очакват </a:t>
-            </a:r>
-            <a:endParaRPr lang="en-US" sz="3450" dirty="0">
-              <a:cs typeface="Calibri"/>
-            </a:endParaRPr>
-          </a:p>
-          <a:p>
-            <a:pPr lvl="1" indent="-360045">
-              <a:buClr>
-                <a:schemeClr val="tx1"/>
-              </a:buClr>
-            </a:pPr>
-            <a:r>
-              <a:rPr lang="en-US" sz="3150" dirty="0"/>
-              <a:t>Ако метода е некомпетентен за хващане на </a:t>
-            </a:r>
-            <a:r>
-              <a:rPr lang="en-US" sz="3150" dirty="0">
+              <a:rPr lang="en-US" sz="3200" dirty="0"/>
+              <a:t>Хващането на всички </a:t>
+            </a:r>
+            <a:r>
+              <a:rPr lang="bg-BG" sz="3200" dirty="0">
                 <a:ea typeface="+mn-lt"/>
                 <a:cs typeface="+mn-lt"/>
               </a:rPr>
-              <a:t>exception, трябва да го оставите</a:t>
-            </a:r>
-            <a:endParaRPr lang="en-US" sz="3150" dirty="0">
-              <a:cs typeface="Calibri"/>
-            </a:endParaRPr>
-          </a:p>
-          <a:p>
-            <a:pPr lvl="1" indent="-360045">
-              <a:buClr>
-                <a:schemeClr val="tx1"/>
-              </a:buClr>
-            </a:pPr>
-            <a:r>
-              <a:rPr lang="en-US" sz="3150" dirty="0"/>
-              <a:t>Хващането на всички </a:t>
-            </a:r>
-            <a:r>
-              <a:rPr lang="en-US" sz="3150" dirty="0">
+              <a:t>изключения</a:t>
+            </a:r>
+            <a:r>
+              <a:rPr lang="en-US" sz="3200" dirty="0">
                 <a:ea typeface="+mn-lt"/>
                 <a:cs typeface="+mn-lt"/>
               </a:rPr>
-              <a:t>exception-и без оглед на техния тип е </a:t>
-            </a:r>
-            <a:r>
-              <a:rPr lang="en-US" sz="3150" b="1" dirty="0">
+              <a:t> без оглед на техния тип е </a:t>
+            </a:r>
+            <a:r>
+              <a:rPr lang="en-US" sz="3200" b="1" dirty="0">
                 <a:solidFill>
                   <a:schemeClr val="bg1"/>
                 </a:solidFill>
@@ -19285,10 +19697,10 @@
               <a:t>лоша практика</a:t>
             </a:r>
             <a:r>
-              <a:rPr lang="en-US" sz="3150" dirty="0"/>
+              <a:rPr lang="en-US" sz="3200" dirty="0"/>
               <a:t>!</a:t>
             </a:r>
-            <a:endParaRPr lang="en-US" sz="3150" dirty="0">
+            <a:endParaRPr lang="en-US" sz="3200" dirty="0">
               <a:cs typeface="Calibri"/>
             </a:endParaRPr>
           </a:p>
@@ -19306,14 +19718,19 @@
         </p:nvSpPr>
         <p:spPr/>
         <p:txBody>
-          <a:bodyPr/>
+          <a:bodyPr>
+            <a:normAutofit/>
+          </a:bodyPr>
           <a:lstStyle/>
           <a:p>
             <a:r>
-              <a:rPr lang="en-GB" sz="3950" dirty="0"/>
-              <a:t>Използване на блока Catch</a:t>
-            </a:r>
-            <a:endParaRPr lang="bg-BG" sz="3950" dirty="0"/>
+              <a:rPr lang="bg-BG" sz="4000" dirty="0"/>
+              <a:t>Утвърдени практики (1)</a:t>
+            </a:r>
+            <a:endParaRPr lang="bg-BG" sz="4000" dirty="0">
+              <a:latin typeface="Consolas" panose="020B0609020204030204" pitchFamily="49" charset="0"/>
+              <a:cs typeface="Consolas" panose="020B0609020204030204" pitchFamily="49" charset="0"/>
+            </a:endParaRPr>
           </a:p>
         </p:txBody>
       </p:sp>
@@ -19428,33 +19845,15 @@
                                   </p:childTnLst>
                                 </p:cTn>
                               </p:par>
-                            </p:childTnLst>
-                          </p:cTn>
-                        </p:par>
-                      </p:childTnLst>
-                    </p:cTn>
-                  </p:par>
-                  <p:par>
-                    <p:cTn id="7" fill="hold">
-                      <p:stCondLst>
-                        <p:cond delay="indefinite"/>
-                      </p:stCondLst>
-                      <p:childTnLst>
-                        <p:par>
-                          <p:cTn id="8" fill="hold">
-                            <p:stCondLst>
-                              <p:cond delay="0"/>
-                            </p:stCondLst>
-                            <p:childTnLst>
                               <p:par>
-                                <p:cTn id="9" presetID="1" presetClass="entr" presetSubtype="0" fill="hold" nodeType="clickEffect">
+                                <p:cTn id="7" presetID="1" presetClass="entr" presetSubtype="0" fill="hold" nodeType="withEffect">
                                   <p:stCondLst>
                                     <p:cond delay="0"/>
                                   </p:stCondLst>
                                   <p:childTnLst>
                                     <p:set>
                                       <p:cBhvr>
-                                        <p:cTn id="10" dur="1" fill="hold">
+                                        <p:cTn id="8" dur="1" fill="hold">
                                           <p:stCondLst>
                                             <p:cond delay="0"/>
                                           </p:stCondLst>
@@ -19484,26 +19883,26 @@
                     </p:cTn>
                   </p:par>
                   <p:par>
-                    <p:cTn id="11" fill="hold">
+                    <p:cTn id="9" fill="hold">
                       <p:stCondLst>
                         <p:cond delay="indefinite"/>
                       </p:stCondLst>
                       <p:childTnLst>
                         <p:par>
-                          <p:cTn id="12" fill="hold">
+                          <p:cTn id="10" fill="hold">
                             <p:stCondLst>
                               <p:cond delay="0"/>
                             </p:stCondLst>
                             <p:childTnLst>
                               <p:par>
-                                <p:cTn id="13" presetID="1" presetClass="entr" presetSubtype="0" fill="hold" nodeType="clickEffect">
+                                <p:cTn id="11" presetID="1" presetClass="entr" presetSubtype="0" fill="hold" nodeType="clickEffect">
                                   <p:stCondLst>
                                     <p:cond delay="0"/>
                                   </p:stCondLst>
                                   <p:childTnLst>
                                     <p:set>
                                       <p:cBhvr>
-                                        <p:cTn id="14" dur="1" fill="hold">
+                                        <p:cTn id="12" dur="1" fill="hold">
                                           <p:stCondLst>
                                             <p:cond delay="0"/>
                                           </p:stCondLst>
@@ -19512,55 +19911,6 @@
                                           <p:spTgt spid="590851">
                                             <p:txEl>
                                               <p:pRg st="4" end="4"/>
-                                            </p:txEl>
-                                          </p:spTgt>
-                                        </p:tgtEl>
-                                        <p:attrNameLst>
-                                          <p:attrName>style.visibility</p:attrName>
-                                        </p:attrNameLst>
-                                      </p:cBhvr>
-                                      <p:to>
-                                        <p:strVal val="visible"/>
-                                      </p:to>
-                                    </p:set>
-                                  </p:childTnLst>
-                                </p:cTn>
-                              </p:par>
-                            </p:childTnLst>
-                          </p:cTn>
-                        </p:par>
-                      </p:childTnLst>
-                    </p:cTn>
-                  </p:par>
-                  <p:par>
-                    <p:cTn id="15" fill="hold">
-                      <p:stCondLst>
-                        <p:cond delay="indefinite"/>
-                      </p:stCondLst>
-                      <p:childTnLst>
-                        <p:par>
-                          <p:cTn id="16" fill="hold">
-                            <p:stCondLst>
-                              <p:cond delay="0"/>
-                            </p:stCondLst>
-                            <p:childTnLst>
-                              <p:par>
-                                <p:cTn id="17" presetID="1" presetClass="entr" presetSubtype="0" fill="hold" nodeType="clickEffect">
-                                  <p:stCondLst>
-                                    <p:cond delay="0"/>
-                                  </p:stCondLst>
-                                  <p:childTnLst>
-                                    <p:set>
-                                      <p:cBhvr>
-                                        <p:cTn id="18" dur="1" fill="hold">
-                                          <p:stCondLst>
-                                            <p:cond delay="0"/>
-                                          </p:stCondLst>
-                                        </p:cTn>
-                                        <p:tgtEl>
-                                          <p:spTgt spid="590851">
-                                            <p:txEl>
-                                              <p:pRg st="5" end="5"/>
                                             </p:txEl>
                                           </p:spTgt>
                                         </p:tgtEl>
@@ -19656,7 +20006,27 @@
                 <a:latin typeface="Calibri"/>
                 <a:cs typeface="Calibri"/>
               </a:rPr>
-              <a:t>Когато имаме невалидни параметри, използваме методите:</a:t>
+              <a:t>Когато имаме </a:t>
+            </a:r>
+            <a:r>
+              <a:rPr lang="en-US" sz="3150" b="1" dirty="0">
+                <a:solidFill>
+                  <a:srgbClr val="234465"/>
+                </a:solidFill>
+                <a:latin typeface="Calibri"/>
+                <a:cs typeface="Calibri"/>
+              </a:rPr>
+              <a:t>невалидни параметри</a:t>
+            </a:r>
+            <a:r>
+              <a:rPr lang="en-US" sz="3150" dirty="0">
+                <a:solidFill>
+                  <a:srgbClr val="234465"/>
+                </a:solidFill>
+                <a:latin typeface="Calibri"/>
+                <a:cs typeface="Calibri"/>
+              </a:rPr>
+              <a:t>, използваме методите:</a:t>
             </a:r>
           </a:p>
           <a:p>
@@ -19669,7 +20039,7 @@
               </a:buClr>
             </a:pPr>
             <a:r>
-              <a:rPr lang="en-US" sz="2950" b="1" noProof="1">
+              <a:rPr lang="en-US" sz="3000" b="1" noProof="1">
                 <a:solidFill>
                   <a:schemeClr val="bg1"/>
                 </a:solidFill>
@@ -19679,11 +20049,11 @@
               <a:t>ArgumentException</a:t>
             </a:r>
             <a:r>
-              <a:rPr lang="en-US" sz="2950" dirty="0"/>
+              <a:rPr lang="en-US" sz="3000" dirty="0"/>
               <a:t>, </a:t>
             </a:r>
             <a:r>
-              <a:rPr lang="en-US" sz="2950" b="1" noProof="1">
+              <a:rPr lang="en-US" sz="3000" b="1" noProof="1">
                 <a:solidFill>
                   <a:schemeClr val="bg1"/>
                 </a:solidFill>
@@ -19693,14 +20063,14 @@
               <a:t>ArgumentNullException</a:t>
             </a:r>
             <a:r>
-              <a:rPr lang="en-US" sz="2950" dirty="0"/>
+              <a:rPr lang="en-US" sz="3000" dirty="0"/>
               <a:t>, </a:t>
             </a:r>
             <a:br>
-              <a:rPr lang="en-US" sz="2950" dirty="0"/>
+              <a:rPr lang="en-US" sz="3000" dirty="0"/>
             </a:br>
             <a:r>
-              <a:rPr lang="en-US" sz="2950" b="1" noProof="1">
+              <a:rPr lang="en-US" sz="3000" b="1" noProof="1">
                 <a:solidFill>
                   <a:schemeClr val="bg1"/>
                 </a:solidFill>
@@ -19727,7 +20097,27 @@
                 <a:latin typeface="Calibri"/>
                 <a:cs typeface="Calibri"/>
               </a:rPr>
-              <a:t>Когато дадена операция не може да се осъществи, използваме:</a:t>
+              <a:t>Когато дадена операция </a:t>
+            </a:r>
+            <a:r>
+              <a:rPr lang="en-US" sz="3150" b="1" dirty="0">
+                <a:solidFill>
+                  <a:srgbClr val="234465"/>
+                </a:solidFill>
+                <a:latin typeface="Calibri"/>
+                <a:cs typeface="Calibri"/>
+              </a:rPr>
+              <a:t>не може да се осъществи</a:t>
+            </a:r>
+            <a:r>
+              <a:rPr lang="en-US" sz="3150" dirty="0">
+                <a:solidFill>
+                  <a:srgbClr val="234465"/>
+                </a:solidFill>
+                <a:latin typeface="Calibri"/>
+                <a:cs typeface="Calibri"/>
+              </a:rPr>
+              <a:t>, използваме:</a:t>
             </a:r>
           </a:p>
           <a:p>
@@ -19740,7 +20130,7 @@
               </a:buClr>
             </a:pPr>
             <a:r>
-              <a:rPr lang="en-US" sz="2950" b="1" noProof="1">
+              <a:rPr lang="en-US" sz="3000" b="1" noProof="1">
                 <a:solidFill>
                   <a:schemeClr val="bg1"/>
                 </a:solidFill>
@@ -19767,7 +20157,47 @@
                 <a:latin typeface="Calibri"/>
                 <a:cs typeface="Calibri"/>
               </a:rPr>
-              <a:t>Когато метод не имплементиран, използваме:</a:t>
+              <a:t>Когато метод </a:t>
+            </a:r>
+            <a:r>
+              <a:rPr lang="en-US" sz="3150" b="1" dirty="0">
+                <a:solidFill>
+                  <a:srgbClr val="234465"/>
+                </a:solidFill>
+                <a:latin typeface="Calibri"/>
+                <a:cs typeface="Calibri"/>
+              </a:rPr>
+              <a:t>не</a:t>
+            </a:r>
+            <a:r>
+              <a:rPr lang="bg-BG" sz="3150" b="1" dirty="0">
+                <a:solidFill>
+                  <a:srgbClr val="234465"/>
+                </a:solidFill>
+                <a:latin typeface="Calibri"/>
+                <a:cs typeface="Calibri"/>
+              </a:rPr>
+              <a:t> е</a:t>
+            </a:r>
+            <a:r>
+              <a:rPr lang="en-US" sz="3150" b="1" dirty="0">
+                <a:solidFill>
+                  <a:srgbClr val="234465"/>
+                </a:solidFill>
+                <a:latin typeface="Calibri"/>
+                <a:cs typeface="Calibri"/>
+              </a:rPr>
+              <a:t> имплементиран</a:t>
+            </a:r>
+            <a:r>
+              <a:rPr lang="en-US" sz="3150" dirty="0">
+                <a:solidFill>
+                  <a:srgbClr val="234465"/>
+                </a:solidFill>
+                <a:latin typeface="Calibri"/>
+                <a:cs typeface="Calibri"/>
+              </a:rPr>
+              <a:t>, използваме:</a:t>
             </a:r>
           </a:p>
           <a:p>
@@ -19780,7 +20210,7 @@
               </a:buClr>
             </a:pPr>
             <a:r>
-              <a:rPr lang="en-US" sz="2950" b="1" noProof="1">
+              <a:rPr lang="en-US" sz="3000" b="1" noProof="1">
                 <a:solidFill>
                   <a:schemeClr val="bg1"/>
                 </a:solidFill>
@@ -19801,7 +20231,19 @@
             </a:pPr>
             <a:r>
               <a:rPr lang="en-US" sz="3150" dirty="0"/>
-              <a:t>Ако няма подходящ exception:</a:t>
+              <a:t>Ако </a:t>
+            </a:r>
+            <a:r>
+              <a:rPr lang="en-US" sz="3150" b="1" dirty="0"/>
+              <a:t>няма </a:t>
+            </a:r>
+            <a:r>
+              <a:rPr lang="bg-BG" sz="3150" b="1" dirty="0"/>
+              <a:t>подходящо изключение</a:t>
+            </a:r>
+            <a:r>
+              <a:rPr lang="en-US" sz="3150" dirty="0"/>
+              <a:t>:</a:t>
             </a:r>
             <a:endParaRPr lang="en-US" sz="3150" dirty="0">
               <a:cs typeface="Calibri"/>
@@ -19817,23 +20259,51 @@
               </a:buClr>
             </a:pPr>
             <a:r>
-              <a:rPr lang="en-US" sz="2950" dirty="0"/>
-              <a:t>Създаваме собствен exception (наследя </a:t>
-            </a:r>
-            <a:r>
-              <a:rPr lang="en-US" sz="2950" b="1" dirty="0">
+              <a:rPr lang="en-US" sz="3000" dirty="0"/>
+              <a:t>Създаваме </a:t>
+            </a:r>
+            <a:r>
+              <a:rPr lang="bg-BG" sz="3000" b="1" dirty="0">
                 <a:solidFill>
                   <a:schemeClr val="bg1"/>
                 </a:solidFill>
+              </a:rPr>
+              <a:t>собствено изключение</a:t>
+            </a:r>
+            <a:r>
+              <a:rPr lang="en-US" sz="3000" b="1" dirty="0">
+                <a:solidFill>
+                  <a:schemeClr val="bg1"/>
+                </a:solidFill>
+              </a:rPr>
+              <a:t> </a:t>
+            </a:r>
+            <a:r>
+              <a:rPr lang="en-US" sz="3000" dirty="0"/>
+              <a:t>(</a:t>
+            </a:r>
+            <a:r>
+              <a:rPr lang="bg-BG" sz="3000" dirty="0"/>
+              <a:t>наследява</a:t>
+            </a:r>
+            <a:r>
+              <a:rPr lang="en-US" sz="3000" dirty="0"/>
+              <a:t> </a:t>
+            </a:r>
+            <a:r>
+              <a:rPr lang="en-US" sz="3000" b="1" dirty="0">
+                <a:solidFill>
+                  <a:schemeClr val="bg1"/>
+                </a:solidFill>
                 <a:latin typeface="Consolas"/>
               </a:rPr>
               <a:t>Exception</a:t>
             </a:r>
             <a:r>
-              <a:rPr lang="en-US" sz="2950" dirty="0"/>
+              <a:rPr lang="en-US" sz="3000" dirty="0"/>
               <a:t>)</a:t>
             </a:r>
-            <a:endParaRPr lang="en-US" sz="2950" noProof="1">
+            <a:endParaRPr lang="en-US" sz="3000" noProof="1">
               <a:solidFill>
                 <a:schemeClr val="accent5">
                   <a:lumMod val="20000"/>
@@ -19858,13 +20328,16 @@
         </p:nvSpPr>
         <p:spPr/>
         <p:txBody>
-          <a:bodyPr/>
+          <a:bodyPr>
+            <a:normAutofit/>
+          </a:bodyPr>
           <a:lstStyle/>
           <a:p>
             <a:r>
-              <a:rPr lang="en-US" sz="3950" dirty="0"/>
-              <a:t>Избиране на exception</a:t>
-            </a:r>
+              <a:rPr lang="bg-BG" sz="4000" dirty="0"/>
+              <a:t>Утвърдени практики (2)</a:t>
+            </a:r>
+            <a:endParaRPr lang="en-US" sz="4000" dirty="0"/>
           </a:p>
         </p:txBody>
       </p:sp>
@@ -20139,33 +20612,15 @@
                                   </p:childTnLst>
                                 </p:cTn>
                               </p:par>
-                            </p:childTnLst>
-                          </p:cTn>
-                        </p:par>
-                      </p:childTnLst>
-                    </p:cTn>
-                  </p:par>
-                  <p:par>
-                    <p:cTn id="19" fill="hold">
-                      <p:stCondLst>
-                        <p:cond delay="indefinite"/>
-                      </p:stCondLst>
-                      <p:childTnLst>
-                        <p:par>
-                          <p:cTn id="20" fill="hold">
-                            <p:stCondLst>
-                              <p:cond delay="0"/>
-                            </p:stCondLst>
-                            <p:childTnLst>
                               <p:par>
-                                <p:cTn id="21" presetID="1" presetClass="entr" presetSubtype="0" fill="hold" nodeType="clickEffect">
+                                <p:cTn id="19" presetID="1" presetClass="entr" presetSubtype="0" fill="hold" nodeType="withEffect">
                                   <p:stCondLst>
                                     <p:cond delay="0"/>
                                   </p:stCondLst>
                                   <p:childTnLst>
                                     <p:set>
                                       <p:cBhvr>
-                                        <p:cTn id="22" dur="1" fill="hold">
+                                        <p:cTn id="20" dur="1" fill="hold">
                                           <p:stCondLst>
                                             <p:cond delay="0"/>
                                           </p:stCondLst>
@@ -20249,35 +20704,9 @@
         <p:spPr/>
         <p:txBody>
           <a:bodyPr vert="horz" lIns="108000" tIns="36000" rIns="108000" bIns="36000" rtlCol="0" anchor="t">
-            <a:normAutofit fontScale="92500" lnSpcReduction="10000"/>
+            <a:normAutofit/>
           </a:bodyPr>
           <a:lstStyle/>
-          <a:p>
-            <a:pPr marL="360045" indent="-360045"/>
-            <a:r>
-              <a:rPr lang="en-US" sz="3450" dirty="0">
-                <a:cs typeface="Calibri"/>
-              </a:rPr>
-              <a:t>Когато един </a:t>
-            </a:r>
-            <a:r>
-              <a:rPr lang="en-US" sz="3450" dirty="0">
-                <a:ea typeface="+mn-lt"/>
-                <a:cs typeface="+mn-lt"/>
-              </a:rPr>
-              <a:t>exception се покачва, винаги трябва да минава </a:t>
-            </a:r>
-            <a:r>
-              <a:rPr lang="en-US" sz="3450" b="1" dirty="0">
-                <a:solidFill>
-                  <a:schemeClr val="bg1"/>
-                </a:solidFill>
-                <a:ea typeface="+mn-lt"/>
-                <a:cs typeface="+mn-lt"/>
-              </a:rPr>
-              <a:t>добро съобщение през конструкторите</a:t>
-            </a:r>
-          </a:p>
           <a:p>
             <a:pPr marL="360045" indent="-360045">
               <a:lnSpc>
@@ -20288,14 +20717,37 @@
               <a:rPr lang="en-US" sz="3450" dirty="0">
                 <a:cs typeface="Calibri"/>
               </a:rPr>
-              <a:t>Когато трябва да хвърляме </a:t>
+              <a:t>Когато хвърляме </a:t>
+            </a:r>
+            <a:r>
+              <a:rPr lang="bg-BG" sz="3450" dirty="0">
+                <a:cs typeface="Calibri"/>
+              </a:rPr>
+              <a:t>изключение</a:t>
             </a:r>
             <a:r>
               <a:rPr lang="en-US" sz="3450" dirty="0">
                 <a:ea typeface="+mn-lt"/>
                 <a:cs typeface="+mn-lt"/>
               </a:rPr>
-              <a:t>exception, трябва да имаме добро описание за грешките</a:t>
+              <a:t>, трябва да имаме </a:t>
+            </a:r>
+            <a:r>
+              <a:rPr lang="en-US" sz="3450" b="1" dirty="0">
+                <a:solidFill>
+                  <a:schemeClr val="bg1"/>
+                </a:solidFill>
+                <a:ea typeface="+mn-lt"/>
+                <a:cs typeface="+mn-lt"/>
+              </a:rPr>
+              <a:t>добро описание </a:t>
+            </a:r>
+            <a:r>
+              <a:rPr lang="en-US" sz="3450" dirty="0">
+                <a:ea typeface="+mn-lt"/>
+                <a:cs typeface="+mn-lt"/>
+              </a:rPr>
+              <a:t>за грешките</a:t>
             </a:r>
           </a:p>
           <a:p>
@@ -20308,7 +20760,46 @@
               <a:rPr lang="en-US" sz="3150" dirty="0">
                 <a:cs typeface="Calibri"/>
               </a:rPr>
-              <a:t>Съобщението трябва да обяснява какъв е проблема и как може да се реши</a:t>
+              <a:t>Съобщението трябва да обяснява </a:t>
+            </a:r>
+            <a:r>
+              <a:rPr lang="en-US" sz="3150" b="1" dirty="0">
+                <a:solidFill>
+                  <a:schemeClr val="bg1"/>
+                </a:solidFill>
+                <a:cs typeface="Calibri"/>
+              </a:rPr>
+              <a:t>какъв е </a:t>
+            </a:r>
+            <a:r>
+              <a:rPr lang="bg-BG" sz="3150" b="1" dirty="0">
+                <a:solidFill>
+                  <a:schemeClr val="bg1"/>
+                </a:solidFill>
+                <a:cs typeface="Calibri"/>
+              </a:rPr>
+              <a:t>проблемът </a:t>
+            </a:r>
+            <a:r>
+              <a:rPr lang="en-US" sz="3150" dirty="0">
+                <a:cs typeface="Calibri"/>
+              </a:rPr>
+              <a:t>и </a:t>
+            </a:r>
+            <a:r>
+              <a:rPr lang="en-US" sz="3150" b="1" dirty="0">
+                <a:solidFill>
+                  <a:schemeClr val="bg1"/>
+                </a:solidFill>
+                <a:cs typeface="Calibri"/>
+              </a:rPr>
+              <a:t>как може да се реши</a:t>
+            </a:r>
+            <a:r>
+              <a:rPr lang="bg-BG" sz="3150" dirty="0">
+                <a:cs typeface="Calibri"/>
+              </a:rPr>
+              <a:t>:</a:t>
             </a:r>
             <a:endParaRPr lang="en-US" sz="3150" dirty="0"/>
           </a:p>
@@ -20319,8 +20810,12 @@
               </a:lnSpc>
             </a:pPr>
             <a:r>
+              <a:rPr lang="bg-BG" sz="2950" dirty="0"/>
+              <a:t>Правилно</a:t>
+            </a:r>
+            <a:r>
               <a:rPr lang="en-US" sz="2950" dirty="0"/>
-              <a:t>Добър: "</a:t>
+              <a:t>: "</a:t>
             </a:r>
             <a:r>
               <a:rPr lang="en-US" sz="2950" i="1" dirty="0"/>
@@ -20341,11 +20836,11 @@
               </a:lnSpc>
             </a:pPr>
             <a:r>
-              <a:rPr lang="en-US" sz="2950" dirty="0">
+              <a:rPr lang="bg-BG" sz="2950" dirty="0">
                 <a:ea typeface="+mn-lt"/>
                 <a:cs typeface="+mn-lt"/>
               </a:rPr>
-              <a:t>Добър</a:t>
+              <a:t>Правилно</a:t>
             </a:r>
             <a:r>
               <a:rPr lang="en-US" sz="2950" dirty="0"/>
@@ -20370,8 +20865,12 @@
               </a:lnSpc>
             </a:pPr>
             <a:r>
+              <a:rPr lang="bg-BG" sz="2950" dirty="0"/>
+              <a:t>Грешно</a:t>
+            </a:r>
+            <a:r>
               <a:rPr lang="en-US" sz="2950" dirty="0"/>
-              <a:t>Лош: "</a:t>
+              <a:t>: "</a:t>
             </a:r>
             <a:r>
               <a:rPr lang="en-US" sz="2950" i="1" dirty="0"/>
@@ -20392,8 +20891,12 @@
               </a:lnSpc>
             </a:pPr>
             <a:r>
+              <a:rPr lang="bg-BG" sz="2950" dirty="0"/>
+              <a:t>Грешно</a:t>
+            </a:r>
+            <a:r>
               <a:rPr lang="en-US" sz="2950" dirty="0"/>
-              <a:t>Лош: "</a:t>
+              <a:t>: "</a:t>
             </a:r>
             <a:r>
               <a:rPr lang="en-US" sz="2950" i="1" dirty="0"/>
@@ -20403,36 +20906,6 @@
               <a:rPr lang="en-US" sz="2950" dirty="0"/>
               <a:t>"</a:t>
             </a:r>
-            <a:endParaRPr lang="en-US" sz="2950" dirty="0">
-              <a:cs typeface="Calibri"/>
-            </a:endParaRPr>
-          </a:p>
-          <a:p>
-            <a:pPr lvl="1" indent="-360045">
-              <a:lnSpc>
-                <a:spcPct val="100000"/>
-              </a:lnSpc>
-            </a:pPr>
-            <a:endParaRPr lang="en-US" dirty="0">
-              <a:cs typeface="Calibri"/>
-            </a:endParaRPr>
-          </a:p>
-          <a:p>
-            <a:pPr lvl="1" indent="-360045">
-              <a:lnSpc>
-                <a:spcPct val="100000"/>
-              </a:lnSpc>
-            </a:pPr>
-            <a:endParaRPr lang="en-US" dirty="0">
-              <a:cs typeface="Calibri"/>
-            </a:endParaRPr>
-          </a:p>
-          <a:p>
-            <a:pPr lvl="1" indent="-360045">
-              <a:lnSpc>
-                <a:spcPct val="100000"/>
-              </a:lnSpc>
-            </a:pPr>
             <a:endParaRPr lang="bg-BG" dirty="0">
               <a:cs typeface="Calibri"/>
             </a:endParaRPr>
@@ -20457,13 +20930,16 @@
         </p:nvSpPr>
         <p:spPr/>
         <p:txBody>
-          <a:bodyPr/>
+          <a:bodyPr>
+            <a:normAutofit/>
+          </a:bodyPr>
           <a:lstStyle/>
           <a:p>
             <a:r>
-              <a:rPr lang="en-US" sz="3950" dirty="0"/>
-              <a:t>Exception – Добра практика (1)</a:t>
-            </a:r>
+              <a:rPr lang="bg-BG" sz="4000" dirty="0"/>
+              <a:t>Утвърдени практики (3)</a:t>
+            </a:r>
+            <a:endParaRPr lang="en-US" sz="4000" dirty="0"/>
           </a:p>
         </p:txBody>
       </p:sp>
@@ -20563,7 +21039,7 @@
                                         <p:tgtEl>
                                           <p:spTgt spid="3">
                                             <p:txEl>
-                                              <p:pRg st="1" end="1"/>
+                                              <p:pRg st="0" end="0"/>
                                             </p:txEl>
                                           </p:spTgt>
                                         </p:tgtEl>
@@ -20612,7 +21088,7 @@
                                         <p:tgtEl>
                                           <p:spTgt spid="3">
                                             <p:txEl>
-                                              <p:pRg st="2" end="2"/>
+                                              <p:pRg st="1" end="1"/>
                                             </p:txEl>
                                           </p:spTgt>
                                         </p:tgtEl>
@@ -20661,7 +21137,7 @@
                                         <p:tgtEl>
                                           <p:spTgt spid="3">
                                             <p:txEl>
-                                              <p:pRg st="3" end="3"/>
+                                              <p:pRg st="2" end="2"/>
                                             </p:txEl>
                                           </p:spTgt>
                                         </p:tgtEl>
@@ -20710,7 +21186,7 @@
                                         <p:tgtEl>
                                           <p:spTgt spid="3">
                                             <p:txEl>
-                                              <p:pRg st="4" end="4"/>
+                                              <p:pRg st="3" end="3"/>
                                             </p:txEl>
                                           </p:spTgt>
                                         </p:tgtEl>
@@ -20759,7 +21235,7 @@
                                         <p:tgtEl>
                                           <p:spTgt spid="3">
                                             <p:txEl>
-                                              <p:pRg st="5" end="5"/>
+                                              <p:pRg st="4" end="4"/>
                                             </p:txEl>
                                           </p:spTgt>
                                         </p:tgtEl>
@@ -20808,7 +21284,7 @@
                                         <p:tgtEl>
                                           <p:spTgt spid="3">
                                             <p:txEl>
-                                              <p:pRg st="6" end="6"/>
+                                              <p:pRg st="5" end="5"/>
                                             </p:txEl>
                                           </p:spTgt>
                                         </p:tgtEl>
@@ -20894,13 +21370,44 @@
               </a:lnSpc>
             </a:pPr>
             <a:r>
-              <a:rPr lang="en-US" sz="3350" dirty="0">
+              <a:rPr lang="bg-BG" sz="3400" dirty="0">
                 <a:ea typeface="+mn-lt"/>
                 <a:cs typeface="+mn-lt"/>
               </a:rPr>
-              <a:t>Exception-ите могат да намалят произведителността на програмата</a:t>
-            </a:r>
-            <a:endParaRPr lang="en-US" sz="3350" dirty="0"/>
+              <a:t>Изключенията</a:t>
+            </a:r>
+            <a:r>
+              <a:rPr lang="en-US" sz="3400" dirty="0">
+                <a:ea typeface="+mn-lt"/>
+                <a:cs typeface="+mn-lt"/>
+              </a:rPr>
+              <a:t> могат да </a:t>
+            </a:r>
+            <a:r>
+              <a:rPr lang="en-US" sz="3400" b="1" dirty="0">
+                <a:solidFill>
+                  <a:schemeClr val="bg1"/>
+                </a:solidFill>
+                <a:ea typeface="+mn-lt"/>
+                <a:cs typeface="+mn-lt"/>
+              </a:rPr>
+              <a:t>намалят произведителността </a:t>
+            </a:r>
+            <a:r>
+              <a:rPr lang="en-US" sz="3400" dirty="0">
+                <a:ea typeface="+mn-lt"/>
+                <a:cs typeface="+mn-lt"/>
+              </a:rPr>
+              <a:t>на програмата</a:t>
+            </a:r>
+            <a:r>
+              <a:rPr lang="bg-BG" sz="3400" dirty="0">
+                <a:ea typeface="+mn-lt"/>
+                <a:cs typeface="+mn-lt"/>
+              </a:rPr>
+              <a:t>:</a:t>
+            </a:r>
+            <a:endParaRPr lang="en-US" sz="3400" dirty="0"/>
           </a:p>
           <a:p>
             <a:pPr lvl="1" indent="-360045">
@@ -20909,19 +21416,26 @@
               </a:lnSpc>
             </a:pPr>
             <a:r>
-              <a:rPr lang="en-US" sz="3150" dirty="0">
+              <a:rPr lang="en-US" sz="3200" dirty="0">
                 <a:cs typeface="Calibri"/>
               </a:rPr>
               <a:t>Хвърляме </a:t>
             </a:r>
             <a:r>
-              <a:rPr lang="en-US" sz="3150" dirty="0">
+              <a:rPr lang="bg-BG" sz="3200" dirty="0">
                 <a:ea typeface="+mn-lt"/>
                 <a:cs typeface="+mn-lt"/>
               </a:rPr>
-              <a:t>exception-и в много важни случаи</a:t>
-            </a:r>
-            <a:endParaRPr lang="en-US" sz="3150" dirty="0"/>
+              <a:t>изключения</a:t>
+            </a:r>
+            <a:r>
+              <a:rPr lang="en-US" sz="3200" dirty="0">
+                <a:ea typeface="+mn-lt"/>
+                <a:cs typeface="+mn-lt"/>
+              </a:rPr>
+              <a:t> в много важни случаи</a:t>
+            </a:r>
+            <a:endParaRPr lang="en-US" sz="3200" dirty="0"/>
           </a:p>
           <a:p>
             <a:pPr lvl="1" indent="-360045">
@@ -20930,19 +21444,26 @@
               </a:lnSpc>
             </a:pPr>
             <a:r>
-              <a:rPr lang="en-US" sz="3150" dirty="0">
+              <a:rPr lang="en-US" sz="3200" dirty="0">
                 <a:cs typeface="Calibri"/>
               </a:rPr>
               <a:t>Не хвърляме </a:t>
             </a:r>
             <a:r>
-              <a:rPr lang="en-US" sz="3150" dirty="0">
+              <a:rPr lang="bg-BG" sz="3200" dirty="0">
                 <a:ea typeface="+mn-lt"/>
                 <a:cs typeface="+mn-lt"/>
               </a:rPr>
-              <a:t>exception в нормалния поток на програмата</a:t>
-            </a:r>
-            <a:endParaRPr lang="en-US" sz="3150" dirty="0">
+              <a:t>изключения</a:t>
+            </a:r>
+            <a:r>
+              <a:rPr lang="en-US" sz="3200" dirty="0">
+                <a:ea typeface="+mn-lt"/>
+                <a:cs typeface="+mn-lt"/>
+              </a:rPr>
+              <a:t> в нормалния поток на програмата</a:t>
+            </a:r>
+            <a:endParaRPr lang="en-US" sz="3200" dirty="0">
               <a:cs typeface="Calibri"/>
             </a:endParaRPr>
           </a:p>
@@ -20953,11 +21474,25 @@
               </a:lnSpc>
             </a:pPr>
             <a:r>
-              <a:rPr lang="en-US" sz="3150" dirty="0">
+              <a:rPr lang="en-US" sz="3200" dirty="0">
                 <a:ea typeface="+mn-lt"/>
                 <a:cs typeface="+mn-lt"/>
               </a:rPr>
-              <a:t>.NET runtime може да хвърли exception-и по всяко време</a:t>
+              <a:t>.NET runtime може да хвърли </a:t>
+            </a:r>
+            <a:r>
+              <a:rPr lang="bg-BG" sz="3200" dirty="0">
+                <a:ea typeface="+mn-lt"/>
+                <a:cs typeface="+mn-lt"/>
+              </a:rPr>
+              <a:t>изключения</a:t>
+            </a:r>
+            <a:r>
+              <a:rPr lang="en-US" sz="3200" dirty="0">
+                <a:ea typeface="+mn-lt"/>
+                <a:cs typeface="+mn-lt"/>
+              </a:rPr>
+              <a:t> по всяко време</a:t>
             </a:r>
           </a:p>
           <a:p>
@@ -20967,11 +21502,11 @@
               </a:lnSpc>
             </a:pPr>
             <a:r>
-              <a:rPr lang="en-US" sz="2950" dirty="0"/>
+              <a:rPr lang="en-US" sz="3000" dirty="0"/>
               <a:t>Примерно </a:t>
             </a:r>
             <a:r>
-              <a:rPr lang="bg-BG" sz="2950" b="1" noProof="1">
+              <a:rPr lang="bg-BG" sz="3000" b="1" noProof="1">
                 <a:solidFill>
                   <a:schemeClr val="bg1"/>
                 </a:solidFill>
@@ -20980,7 +21515,7 @@
               </a:rPr>
               <a:t>System.OutOfMemoryException</a:t>
             </a:r>
-            <a:endParaRPr lang="bg-BG" sz="2950" b="1" dirty="0">
+            <a:endParaRPr lang="bg-BG" sz="3000" b="1" dirty="0">
               <a:solidFill>
                 <a:schemeClr val="bg1"/>
               </a:solidFill>
@@ -21002,25 +21537,15 @@
         </p:nvSpPr>
         <p:spPr/>
         <p:txBody>
-          <a:bodyPr/>
+          <a:bodyPr>
+            <a:normAutofit/>
+          </a:bodyPr>
           <a:lstStyle/>
           <a:p>
             <a:r>
-              <a:rPr lang="en-US" sz="3950" dirty="0"/>
-              <a:t>Exceptions – </a:t>
-            </a:r>
-            <a:r>
-              <a:rPr lang="en-US" sz="3950" dirty="0">
-                <a:ea typeface="+mj-lt"/>
-                <a:cs typeface="+mj-lt"/>
-              </a:rPr>
-              <a:t>Добра практика</a:t>
-            </a:r>
-            <a:r>
-              <a:rPr lang="en-US" sz="3950" dirty="0"/>
-              <a:t> (2)</a:t>
-            </a:r>
-            <a:endParaRPr lang="bg-BG" sz="3950" dirty="0"/>
+              <a:rPr lang="bg-BG" sz="4000" dirty="0"/>
+              <a:t>Утвърдени практики (4)</a:t>
+            </a:r>
           </a:p>
         </p:txBody>
       </p:sp>
@@ -21331,8 +21856,20 @@
           <a:p>
             <a:pPr marL="360045" indent="-360045"/>
             <a:r>
+              <a:rPr lang="bg-BG" sz="3350" dirty="0"/>
+              <a:t>Новото (създадено от нас)</a:t>
+            </a:r>
+            <a:r>
               <a:rPr lang="en-US" sz="3350" dirty="0"/>
-              <a:t>Персонализирания exception  наследява класа exception class (Примерно </a:t>
+              <a:t> </a:t>
+            </a:r>
+            <a:r>
+              <a:rPr lang="bg-BG" sz="3350" dirty="0"/>
+              <a:t>изключение</a:t>
+            </a:r>
+            <a:r>
+              <a:rPr lang="en-US" sz="3350" dirty="0"/>
+              <a:t> наследява класа </a:t>
             </a:r>
             <a:r>
               <a:rPr lang="en-US" sz="3350" b="1" noProof="1">
@@ -21345,11 +21882,15 @@
               <a:t>System.Exception</a:t>
             </a:r>
             <a:r>
-              <a:rPr lang="en-US" sz="3350" dirty="0"/>
-              <a:t>)</a:t>
+              <a:rPr lang="en-US" sz="3350" noProof="1">
+                <a:latin typeface="Calibri" panose="020F0502020204030204" pitchFamily="34" charset="0"/>
+                <a:cs typeface="Calibri" panose="020F0502020204030204" pitchFamily="34" charset="0"/>
+              </a:rPr>
+              <a:t>:</a:t>
             </a:r>
             <a:endParaRPr lang="bg-BG" sz="3350" dirty="0">
-              <a:cs typeface="Calibri"/>
+              <a:latin typeface="Calibri" panose="020F0502020204030204" pitchFamily="34" charset="0"/>
+              <a:cs typeface="Calibri" panose="020F0502020204030204" pitchFamily="34" charset="0"/>
             </a:endParaRPr>
           </a:p>
           <a:p>
@@ -21384,11 +21925,25 @@
               <a:t>Хвърляме </a:t>
             </a:r>
             <a:r>
+              <a:rPr lang="bg-BG" sz="3350" dirty="0">
+                <a:ea typeface="+mn-lt"/>
+                <a:cs typeface="+mn-lt"/>
+              </a:rPr>
+              <a:t>изключението,</a:t>
+            </a:r>
+            <a:r>
               <a:rPr lang="en-US" sz="3350" dirty="0">
                 <a:ea typeface="+mn-lt"/>
                 <a:cs typeface="+mn-lt"/>
               </a:rPr>
-              <a:t>exception както другите</a:t>
+              <a:t> както другите</a:t>
+            </a:r>
+            <a:r>
+              <a:rPr lang="bg-BG" sz="3350" dirty="0">
+                <a:ea typeface="+mn-lt"/>
+                <a:cs typeface="+mn-lt"/>
+              </a:rPr>
+              <a:t>:</a:t>
             </a:r>
             <a:endParaRPr lang="en-US" sz="3350" dirty="0">
               <a:cs typeface="Calibri"/>
@@ -21413,8 +21968,21 @@
           <a:p>
             <a:r>
               <a:rPr lang="en-US" sz="3950" dirty="0"/>
-              <a:t>Съзадаване на персонален exception</a:t>
-            </a:r>
+              <a:t>Съзадаване на </a:t>
+            </a:r>
+            <a:r>
+              <a:rPr lang="bg-BG" sz="3950" dirty="0"/>
+              <a:t>ново</a:t>
+            </a:r>
+            <a:r>
+              <a:rPr lang="en-US" sz="3950" dirty="0"/>
+              <a:t> </a:t>
+            </a:r>
+            <a:r>
+              <a:rPr lang="bg-BG" sz="3950" dirty="0"/>
+              <a:t>изключение</a:t>
+            </a:r>
+            <a:endParaRPr lang="en-US" sz="3950" dirty="0"/>
           </a:p>
         </p:txBody>
       </p:sp>
@@ -21428,7 +21996,7 @@
         </p:nvSpPr>
         <p:spPr bwMode="auto">
           <a:xfrm>
-            <a:off x="729696" y="2484247"/>
+            <a:off x="696000" y="2484247"/>
             <a:ext cx="10584944" cy="2298729"/>
           </a:xfrm>
           <a:prstGeom prst="rect">
@@ -21562,7 +22130,7 @@
         </p:nvSpPr>
         <p:spPr bwMode="auto">
           <a:xfrm>
-            <a:off x="729699" y="5633427"/>
+            <a:off x="696000" y="5634731"/>
             <a:ext cx="10584943" cy="618707"/>
           </a:xfrm>
           <a:prstGeom prst="rect">
@@ -22373,8 +22941,8 @@
         </p:nvSpPr>
         <p:spPr>
           <a:xfrm>
-            <a:off x="715466" y="1657149"/>
-            <a:ext cx="10917132" cy="4909036"/>
+            <a:off x="715465" y="1584000"/>
+            <a:ext cx="11026320" cy="4909036"/>
           </a:xfrm>
           <a:prstGeom prst="rect">
             <a:avLst/>
@@ -22400,12 +22968,20 @@
               <a:buChar char="§"/>
             </a:pPr>
             <a:r>
+              <a:rPr lang="bg-BG" sz="3400" dirty="0">
+                <a:solidFill>
+                  <a:schemeClr val="bg2"/>
+                </a:solidFill>
+              </a:rPr>
+              <a:t>Изключенията осигуряват</a:t>
+            </a:r>
+            <a:r>
               <a:rPr lang="en-US" sz="3400" dirty="0">
                 <a:solidFill>
                   <a:schemeClr val="bg2"/>
                 </a:solidFill>
               </a:rPr>
-              <a:t>Exception осигурява </a:t>
+              <a:t> </a:t>
             </a:r>
             <a:r>
               <a:rPr lang="en-US" sz="3400" b="1" dirty="0">
@@ -22425,6 +23001,14 @@
                 </a:solidFill>
               </a:rPr>
               <a:t> механизъм за хващане на грешки</a:t>
+            </a:r>
+            <a:r>
+              <a:rPr lang="bg-BG" sz="3400" dirty="0">
+                <a:solidFill>
+                  <a:schemeClr val="bg2"/>
+                </a:solidFill>
+              </a:rPr>
+              <a:t>:</a:t>
             </a:r>
             <a:endParaRPr lang="en-US" sz="3400" dirty="0">
               <a:solidFill>
@@ -22486,8 +23070,10 @@
                     <a:lumOff val="40000"/>
                   </a:schemeClr>
                 </a:solidFill>
-              </a:rPr>
-              <a:t>Try-catch</a:t>
+                <a:latin typeface="Consolas" panose="020B0609020204030204" pitchFamily="49" charset="0"/>
+                <a:cs typeface="Consolas" panose="020B0609020204030204" pitchFamily="49" charset="0"/>
+              </a:rPr>
+              <a:t>try-catch</a:t>
             </a:r>
             <a:r>
               <a:rPr lang="en-US" sz="3400" dirty="0">
@@ -22495,7 +23081,15 @@
                   <a:schemeClr val="bg2"/>
                 </a:solidFill>
               </a:rPr>
-              <a:t> позволява да хващаме exception-и</a:t>
+              <a:t> позволява да хващаме </a:t>
+            </a:r>
+            <a:r>
+              <a:rPr lang="bg-BG" sz="3400" dirty="0">
+                <a:solidFill>
+                  <a:schemeClr val="bg2"/>
+                </a:solidFill>
+              </a:rPr>
+              <a:t>изключения</a:t>
             </a:r>
             <a:endParaRPr lang="en-US" sz="3400" dirty="0">
               <a:solidFill>
@@ -22548,14 +23142,24 @@
               <a:t>Нехванати </a:t>
             </a:r>
             <a:r>
-              <a:rPr lang="en-US" sz="3400" dirty="0">
+              <a:rPr lang="bg-BG" sz="3400" dirty="0">
                 <a:solidFill>
                   <a:schemeClr val="bg2"/>
                 </a:solidFill>
                 <a:ea typeface="+mn-lt"/>
                 <a:cs typeface="+mn-lt"/>
               </a:rPr>
-              <a:t>exception-и приченяват съобщение с грешка</a:t>
+              <a:t>изключения причиняват</a:t>
+            </a:r>
+            <a:r>
+              <a:rPr lang="en-US" sz="3400" dirty="0">
+                <a:solidFill>
+                  <a:schemeClr val="bg2"/>
+                </a:solidFill>
+                <a:ea typeface="+mn-lt"/>
+                <a:cs typeface="+mn-lt"/>
+              </a:rPr>
+              <a:t> съобщение с грешка</a:t>
             </a:r>
           </a:p>
           <a:p>
@@ -22588,8 +23192,10 @@
                     <a:lumOff val="40000"/>
                   </a:schemeClr>
                 </a:solidFill>
-              </a:rPr>
-              <a:t>Try-finally</a:t>
+                <a:latin typeface="Consolas" panose="020B0609020204030204" pitchFamily="49" charset="0"/>
+                <a:cs typeface="Consolas" panose="020B0609020204030204" pitchFamily="49" charset="0"/>
+              </a:rPr>
+              <a:t>finally</a:t>
             </a:r>
             <a:r>
               <a:rPr lang="en-US" sz="3400" dirty="0">
@@ -23458,6 +24064,35 @@
       </p:pic>
       <p:sp>
         <p:nvSpPr>
+          <p:cNvPr id="4" name="Subtitle 3">
+            <a:extLst>
+              <a:ext uri="{FF2B5EF4-FFF2-40B4-BE49-F238E27FC236}">
+                <a16:creationId xmlns:a16="http://schemas.microsoft.com/office/drawing/2014/main" id="{88CEF802-9EDA-9A95-1F8B-5B6B3F11EC9C}"/>
+              </a:ext>
+            </a:extLst>
+          </p:cNvPr>
+          <p:cNvSpPr>
+            <a:spLocks noGrp="1"/>
+          </p:cNvSpPr>
+          <p:nvPr>
+            <p:ph type="subTitle" sz="quarter" idx="11"/>
+          </p:nvPr>
+        </p:nvSpPr>
+        <p:spPr/>
+        <p:txBody>
+          <a:bodyPr/>
+          <a:lstStyle/>
+          <a:p>
+            <a:r>
+              <a:rPr lang="bg-BG" dirty="0"/>
+              <a:t>Същност, синтаксис, видове</a:t>
+            </a:r>
+            <a:endParaRPr lang="en-BG" dirty="0"/>
+          </a:p>
+        </p:txBody>
+      </p:sp>
+      <p:sp>
+        <p:nvSpPr>
           <p:cNvPr id="3" name="Title 2">
             <a:extLst>
               <a:ext uri="{FF2B5EF4-FFF2-40B4-BE49-F238E27FC236}">
@@ -23472,17 +24107,21 @@
             <p:ph type="title" sz="quarter" idx="10"/>
           </p:nvPr>
         </p:nvSpPr>
-        <p:spPr/>
+        <p:spPr>
+          <a:xfrm>
+            <a:off x="615109" y="4704825"/>
+            <a:ext cx="10961783" cy="768084"/>
+          </a:xfrm>
+        </p:spPr>
         <p:txBody>
           <a:bodyPr/>
           <a:lstStyle/>
           <a:p>
             <a:r>
-              <a:rPr lang="en-US" sz="5350" dirty="0">
-                <a:cs typeface="Arial"/>
-              </a:rPr>
-              <a:t>Какво е еxception?</a:t>
-            </a:r>
+              <a:rPr lang="bg-BG" dirty="0"/>
+              <a:t>Изключения</a:t>
+            </a:r>
+            <a:endParaRPr lang="en-US" dirty="0"/>
           </a:p>
         </p:txBody>
       </p:sp>
@@ -23542,8 +24181,8 @@
         </p:nvSpPr>
         <p:spPr>
           <a:xfrm>
-            <a:off x="1971167" y="999634"/>
-            <a:ext cx="10126596" cy="5545145"/>
+            <a:off x="1821000" y="864000"/>
+            <a:ext cx="10371000" cy="5545145"/>
           </a:xfrm>
         </p:spPr>
         <p:txBody>
@@ -23561,12 +24200,12 @@
               </a:buClr>
             </a:pPr>
             <a:r>
-              <a:rPr lang="en-US" sz="3350" b="1" dirty="0">
+              <a:rPr lang="bg-BG" sz="3350" b="1" dirty="0">
                 <a:solidFill>
                   <a:schemeClr val="bg1"/>
                 </a:solidFill>
               </a:rPr>
-              <a:t>Exceptions</a:t>
+              <a:t>Изключение ==</a:t>
             </a:r>
             <a:r>
               <a:rPr lang="en-US" sz="3350" b="1" dirty="0"/>
@@ -23574,15 +24213,7 @@
             </a:r>
             <a:r>
               <a:rPr lang="en-US" sz="3350" dirty="0"/>
-              <a:t>хвърля грешка и проблем, </a:t>
-            </a:r>
-            <a:r>
-              <a:rPr lang="en-US" sz="3350" dirty="0" err="1"/>
-              <a:t>когато</a:t>
-            </a:r>
-            <a:r>
-              <a:rPr lang="en-US" sz="3350" dirty="0"/>
-              <a:t> програмата работи</a:t>
+              <a:t>грешка, когато програмата работи</a:t>
             </a:r>
             <a:endParaRPr lang="en-US" sz="3350" dirty="0">
               <a:cs typeface="Calibri"/>
@@ -23602,52 +24233,61 @@
                 <a:ea typeface="+mn-lt"/>
                 <a:cs typeface="+mn-lt"/>
               </a:rPr>
-              <a:t>Използваме </a:t>
-            </a:r>
-            <a:r>
-              <a:rPr lang="en-US" sz="3350" b="1" dirty="0">
-                <a:solidFill>
-                  <a:schemeClr val="bg1"/>
-                </a:solidFill>
+              <a:t>Използваме</a:t>
+            </a:r>
+            <a:r>
+              <a:rPr lang="bg-BG" sz="3350" dirty="0">
                 <a:ea typeface="+mn-lt"/>
                 <a:cs typeface="+mn-lt"/>
               </a:rPr>
-              <a:t>throw</a:t>
-            </a:r>
-            <a:r>
-              <a:rPr lang="en-US" sz="3350" b="1" dirty="0">
-                <a:ea typeface="+mn-lt"/>
-                <a:cs typeface="+mn-lt"/>
-              </a:rPr>
-              <a:t> </a:t>
+              <a:t> ключовата дума</a:t>
             </a:r>
             <a:r>
               <a:rPr lang="en-US" sz="3350" dirty="0">
                 <a:ea typeface="+mn-lt"/>
                 <a:cs typeface="+mn-lt"/>
               </a:rPr>
-              <a:t> за</a:t>
-            </a:r>
-            <a:r>
-              <a:rPr lang="en-US" sz="3350" dirty="0"/>
-              <a:t> да хвърлем  </a:t>
+              <a:t> </a:t>
             </a:r>
             <a:r>
               <a:rPr lang="en-US" sz="3350" b="1" dirty="0">
                 <a:solidFill>
                   <a:schemeClr val="bg1"/>
                 </a:solidFill>
+                <a:latin typeface="Consolas" panose="020B0609020204030204" pitchFamily="49" charset="0"/>
+                <a:ea typeface="+mn-lt"/>
+                <a:cs typeface="Consolas" panose="020B0609020204030204" pitchFamily="49" charset="0"/>
+              </a:rPr>
+              <a:t>throw</a:t>
+            </a:r>
+            <a:r>
+              <a:rPr lang="bg-BG" sz="3350" dirty="0">
                 <a:ea typeface="+mn-lt"/>
                 <a:cs typeface="+mn-lt"/>
               </a:rPr>
-              <a:t>exceptions</a:t>
-            </a:r>
-            <a:r>
-              <a:rPr lang="en-US" sz="3350" b="1" dirty="0">
+              <a:t>, </a:t>
+            </a:r>
+            <a:r>
+              <a:rPr lang="en-US" sz="3350" dirty="0">
                 <a:ea typeface="+mn-lt"/>
                 <a:cs typeface="+mn-lt"/>
               </a:rPr>
-              <a:t> </a:t>
+              <a:t>за</a:t>
+            </a:r>
+            <a:r>
+              <a:rPr lang="en-US" sz="3350" dirty="0"/>
+              <a:t> да</a:t>
+            </a:r>
+            <a:r>
+              <a:rPr lang="bg-BG" sz="3350" dirty="0"/>
+              <a:t> </a:t>
+            </a:r>
+            <a:br>
+              <a:rPr lang="bg-BG" sz="3350" dirty="0"/>
+            </a:br>
+            <a:r>
+              <a:rPr lang="bg-BG" sz="3350" dirty="0"/>
+              <a:t>"хвърлим" изключение:</a:t>
             </a:r>
             <a:endParaRPr lang="bg-BG" sz="3350" dirty="0">
               <a:ea typeface="+mn-lt"/>
@@ -23700,6 +24340,8 @@
                 <a:solidFill>
                   <a:schemeClr val="bg1"/>
                 </a:solidFill>
+                <a:latin typeface="Consolas" panose="020B0609020204030204" pitchFamily="49" charset="0"/>
+                <a:cs typeface="Consolas" panose="020B0609020204030204" pitchFamily="49" charset="0"/>
               </a:rPr>
               <a:t>Catch</a:t>
             </a:r>
@@ -23709,7 +24351,31 @@
                   <a:srgbClr val="234465"/>
                 </a:solidFill>
               </a:rPr>
-              <a:t> хваща проблем, за да го оправи</a:t>
+              <a:t> хваща </a:t>
+            </a:r>
+            <a:r>
+              <a:rPr lang="bg-BG" sz="3350" dirty="0">
+                <a:solidFill>
+                  <a:srgbClr val="234465"/>
+                </a:solidFill>
+              </a:rPr>
+              <a:t>изключение и</a:t>
+            </a:r>
+            <a:r>
+              <a:rPr lang="en-US" sz="3350" dirty="0">
+                <a:solidFill>
+                  <a:srgbClr val="234465"/>
+                </a:solidFill>
+              </a:rPr>
+              <a:t> </a:t>
+            </a:r>
+            <a:r>
+              <a:rPr lang="bg-BG" sz="3350" dirty="0">
+                <a:solidFill>
+                  <a:srgbClr val="234465"/>
+                </a:solidFill>
+              </a:rPr>
+              <a:t>изпълнява даден код:</a:t>
             </a:r>
             <a:endParaRPr lang="en-US" sz="3350" dirty="0">
               <a:solidFill>
@@ -23746,7 +24412,21 @@
                 <a:ea typeface="+mj-lt"/>
                 <a:cs typeface="+mj-lt"/>
               </a:rPr>
-              <a:t>Какво е еxception?</a:t>
+              <a:t>Какво е </a:t>
+            </a:r>
+            <a:r>
+              <a:rPr lang="bg-BG" sz="3950" dirty="0">
+                <a:ea typeface="+mj-lt"/>
+                <a:cs typeface="+mj-lt"/>
+              </a:rPr>
+              <a:t>изключение</a:t>
+            </a:r>
+            <a:r>
+              <a:rPr lang="en-US" sz="3950" dirty="0">
+                <a:ea typeface="+mj-lt"/>
+                <a:cs typeface="+mj-lt"/>
+              </a:rPr>
+              <a:t>?</a:t>
             </a:r>
             <a:endParaRPr lang="en-US" sz="3950" b="0" dirty="0">
               <a:ea typeface="+mj-lt"/>
@@ -23771,7 +24451,7 @@
         </p:nvSpPr>
         <p:spPr bwMode="auto">
           <a:xfrm>
-            <a:off x="2455697" y="2831442"/>
+            <a:off x="2270999" y="2655831"/>
             <a:ext cx="8988931" cy="1040443"/>
           </a:xfrm>
           <a:prstGeom prst="rect">
@@ -24050,7 +24730,7 @@
         </p:nvSpPr>
         <p:spPr bwMode="auto">
           <a:xfrm>
-            <a:off x="2455697" y="4509283"/>
+            <a:off x="2271000" y="4509283"/>
             <a:ext cx="8988931" cy="2298729"/>
           </a:xfrm>
           <a:prstGeom prst="rect">
@@ -24744,8 +25424,28 @@
           <a:lstStyle/>
           <a:p>
             <a:r>
+              <a:rPr lang="bg-BG" sz="3950" dirty="0"/>
+              <a:t>Как</a:t>
+            </a:r>
+            <a:r>
               <a:rPr lang="en-US" sz="3950" dirty="0"/>
-              <a:t>Как работят Exception-ите?</a:t>
+              <a:t> </a:t>
+            </a:r>
+            <a:r>
+              <a:rPr lang="bg-BG" sz="3950" dirty="0"/>
+              <a:t>работят</a:t>
+            </a:r>
+            <a:r>
+              <a:rPr lang="en-US" sz="3950" dirty="0"/>
+              <a:t> </a:t>
+            </a:r>
+            <a:r>
+              <a:rPr lang="bg-BG" sz="3950" dirty="0"/>
+              <a:t>изключенията</a:t>
+            </a:r>
+            <a:r>
+              <a:rPr lang="en-US" sz="3950" dirty="0"/>
+              <a:t>?</a:t>
             </a:r>
           </a:p>
         </p:txBody>
@@ -24816,6 +25516,8 @@
                 <a:solidFill>
                   <a:srgbClr val="FFFFFF"/>
                 </a:solidFill>
+                <a:latin typeface="Consolas" panose="020B0609020204030204" pitchFamily="49" charset="0"/>
+                <a:cs typeface="Consolas" panose="020B0609020204030204" pitchFamily="49" charset="0"/>
               </a:rPr>
               <a:t>try</a:t>
             </a:r>
@@ -24836,8 +25538,8 @@
         </p:nvSpPr>
         <p:spPr bwMode="auto">
           <a:xfrm>
-            <a:off x="6021080" y="2124340"/>
-            <a:ext cx="4258831" cy="837982"/>
+            <a:off x="6021080" y="1989000"/>
+            <a:ext cx="4349920" cy="1087606"/>
           </a:xfrm>
           <a:prstGeom prst="roundRect">
             <a:avLst/>
@@ -24892,6 +25594,21 @@
               </a:rPr>
               <a:t>Изпълнява код</a:t>
             </a:r>
+            <a:r>
+              <a:rPr lang="bg-BG" sz="2750" b="1" dirty="0">
+                <a:solidFill>
+                  <a:srgbClr val="FFFFFF"/>
+                </a:solidFill>
+                <a:cs typeface="Calibri"/>
+              </a:rPr>
+              <a:t>, с който се тества част от програмата</a:t>
+            </a:r>
+            <a:endParaRPr lang="en-US" sz="2750" b="1" dirty="0">
+              <a:solidFill>
+                <a:srgbClr val="FFFFFF"/>
+              </a:solidFill>
+              <a:cs typeface="Calibri"/>
+            </a:endParaRPr>
           </a:p>
         </p:txBody>
       </p:sp>
@@ -25010,6 +25727,8 @@
                 <a:solidFill>
                   <a:srgbClr val="FFFFFF"/>
                 </a:solidFill>
+                <a:latin typeface="Consolas" panose="020B0609020204030204" pitchFamily="49" charset="0"/>
+                <a:cs typeface="Consolas" panose="020B0609020204030204" pitchFamily="49" charset="0"/>
               </a:rPr>
               <a:t>catch</a:t>
             </a:r>
@@ -25031,7 +25750,7 @@
         <p:spPr bwMode="auto">
           <a:xfrm>
             <a:off x="6021080" y="3333499"/>
-            <a:ext cx="4258831" cy="1087607"/>
+            <a:ext cx="4349920" cy="1087607"/>
           </a:xfrm>
           <a:prstGeom prst="roundRect">
             <a:avLst/>
@@ -25083,15 +25802,15 @@
                   <a:srgbClr val="FFFFFF"/>
                 </a:solidFill>
               </a:rPr>
-              <a:t>Изпънява определен код, </a:t>
-            </a:r>
-            <a:r>
-              <a:rPr lang="en-US" sz="2750" b="1" dirty="0" err="1">
+              <a:t>Изпънява определен код,</a:t>
+            </a:r>
+            <a:r>
+              <a:rPr lang="bg-BG" sz="2750" b="1" dirty="0">
                 <a:solidFill>
                   <a:srgbClr val="FFFFFF"/>
                 </a:solidFill>
               </a:rPr>
-              <a:t>ако</a:t>
+              <a:t> </a:t>
             </a:r>
             <a:r>
               <a:rPr lang="en-US" sz="2750" b="1" dirty="0">
@@ -25099,8 +25818,21 @@
                   <a:srgbClr val="FFFFFF"/>
                 </a:solidFill>
               </a:rPr>
-              <a:t> има exception</a:t>
-            </a:r>
+              <a:t>ако има </a:t>
+            </a:r>
+            <a:r>
+              <a:rPr lang="bg-BG" sz="2750" b="1" dirty="0">
+                <a:solidFill>
+                  <a:srgbClr val="FFFFFF"/>
+                </a:solidFill>
+              </a:rPr>
+              <a:t>изключение</a:t>
+            </a:r>
+            <a:endParaRPr lang="en-US" sz="2750" b="1" dirty="0">
+              <a:solidFill>
+                <a:srgbClr val="FFFFFF"/>
+              </a:solidFill>
+            </a:endParaRPr>
           </a:p>
         </p:txBody>
       </p:sp>
@@ -25170,6 +25902,8 @@
                 <a:solidFill>
                   <a:srgbClr val="FFFFFF"/>
                 </a:solidFill>
+                <a:latin typeface="Consolas" panose="020B0609020204030204" pitchFamily="49" charset="0"/>
+                <a:cs typeface="Consolas" panose="020B0609020204030204" pitchFamily="49" charset="0"/>
               </a:rPr>
               <a:t>finally</a:t>
             </a:r>
@@ -25238,12 +25972,12 @@
           <a:p>
             <a:pPr algn="ctr"/>
             <a:r>
-              <a:rPr lang="en-US" sz="2750" b="1" dirty="0">
+              <a:rPr lang="bg-BG" sz="2750" b="1" dirty="0">
                 <a:solidFill>
                   <a:srgbClr val="FFFFFF"/>
                 </a:solidFill>
               </a:rPr>
-              <a:t>Винаги изпълнява код</a:t>
+              <a:t>Изпълнява код след проверката</a:t>
             </a:r>
             <a:endParaRPr lang="bg-BG" dirty="0"/>
           </a:p>
@@ -25679,7 +26413,12 @@
             <p:ph type="body" sz="quarter" idx="10"/>
           </p:nvPr>
         </p:nvSpPr>
-        <p:spPr/>
+        <p:spPr>
+          <a:xfrm>
+            <a:off x="2062766" y="1121682"/>
+            <a:ext cx="10129234" cy="5546589"/>
+          </a:xfrm>
+        </p:spPr>
         <p:txBody>
           <a:bodyPr vert="horz" lIns="108000" tIns="36000" rIns="108000" bIns="36000" rtlCol="0" anchor="t">
             <a:normAutofit/>
@@ -25692,40 +26431,28 @@
               </a:lnSpc>
             </a:pPr>
             <a:r>
-              <a:rPr lang="en-US" sz="3350" dirty="0"/>
-              <a:t>Exceptions са </a:t>
-            </a:r>
-            <a:r>
-              <a:rPr lang="en-US" sz="3350" b="1" dirty="0">
+              <a:rPr lang="bg-BG" sz="3400" dirty="0"/>
+              <a:t>В </a:t>
+            </a:r>
+            <a:r>
+              <a:rPr lang="en-US" sz="3400" dirty="0"/>
+              <a:t>C# </a:t>
+            </a:r>
+            <a:r>
+              <a:rPr lang="bg-BG" sz="3400" dirty="0"/>
+              <a:t>за хващане на грешки се използва класът </a:t>
+            </a:r>
+            <a:r>
+              <a:rPr lang="ru-RU" sz="3400" b="1" dirty="0">
                 <a:solidFill>
                   <a:schemeClr val="bg1"/>
                 </a:solidFill>
-              </a:rPr>
-              <a:t>класове </a:t>
-            </a:r>
-            <a:r>
-              <a:rPr lang="en-US" sz="3350" b="1" dirty="0">
-                <a:solidFill>
-                  <a:schemeClr val="bg1"/>
-                </a:solidFill>
-                <a:ea typeface="+mn-lt"/>
-                <a:cs typeface="+mn-lt"/>
-              </a:rPr>
-              <a:t> </a:t>
-            </a:r>
-            <a:r>
-              <a:rPr lang="en-US" sz="3350" dirty="0">
-                <a:ea typeface="+mn-lt"/>
-                <a:cs typeface="+mn-lt"/>
-              </a:rPr>
-              <a:t>в C#</a:t>
-            </a:r>
-            <a:endParaRPr lang="ru-RU" sz="3350" b="1" dirty="0">
-              <a:solidFill>
-                <a:schemeClr val="bg1"/>
-              </a:solidFill>
-              <a:cs typeface="Calibri"/>
-            </a:endParaRPr>
+                <a:latin typeface="Consolas"/>
+                <a:cs typeface="Consolas" pitchFamily="49" charset="0"/>
+              </a:rPr>
+              <a:t>System.Exception</a:t>
+            </a:r>
+            <a:endParaRPr lang="en-US" sz="3400" dirty="0"/>
           </a:p>
           <a:p>
             <a:pPr marL="360045" indent="-360045">
@@ -25734,57 +26461,26 @@
               </a:lnSpc>
             </a:pPr>
             <a:r>
-              <a:rPr lang="en-US" sz="3350" dirty="0"/>
-              <a:t>Класа </a:t>
-            </a:r>
-            <a:r>
-              <a:rPr lang="ru-RU" sz="3350" b="1" dirty="0">
+              <a:rPr lang="bg-BG" sz="3400" dirty="0"/>
+              <a:t>Той съдържа </a:t>
+            </a:r>
+            <a:r>
+              <a:rPr lang="en-US" sz="3400" dirty="0"/>
+              <a:t>информация за </a:t>
+            </a:r>
+            <a:r>
+              <a:rPr lang="en-US" sz="3400" b="1" dirty="0">
                 <a:solidFill>
                   <a:schemeClr val="bg1"/>
                 </a:solidFill>
-                <a:latin typeface="Consolas"/>
-                <a:cs typeface="Consolas" pitchFamily="49" charset="0"/>
-              </a:rPr>
-              <a:t>System.Exception</a:t>
-            </a:r>
-            <a:r>
-              <a:rPr lang="ru-RU" sz="3350" dirty="0">
-                <a:solidFill>
-                  <a:schemeClr val="bg1"/>
-                </a:solidFill>
-              </a:rPr>
-              <a:t> </a:t>
-            </a:r>
-            <a:r>
-              <a:rPr lang="en-US" sz="3350" dirty="0"/>
-              <a:t>е базиран за всички exception-и в CLR</a:t>
-            </a:r>
-            <a:endParaRPr lang="ru-RU" sz="3350" dirty="0">
-              <a:cs typeface="Calibri"/>
-            </a:endParaRPr>
-          </a:p>
-          <a:p>
-            <a:pPr lvl="1" indent="-360045">
-              <a:lnSpc>
-                <a:spcPct val="100000"/>
-              </a:lnSpc>
-            </a:pPr>
-            <a:r>
-              <a:rPr lang="en-US" sz="3150" dirty="0"/>
-              <a:t>Съдържа информация за </a:t>
-            </a:r>
-            <a:r>
-              <a:rPr lang="en-US" sz="3150" b="1" dirty="0">
-                <a:solidFill>
-                  <a:schemeClr val="bg1"/>
-                </a:solidFill>
               </a:rPr>
               <a:t>грешки</a:t>
             </a:r>
-            <a:endParaRPr lang="en-US" sz="3150" b="1" dirty="0">
-              <a:solidFill>
-                <a:schemeClr val="bg1"/>
-              </a:solidFill>
+            <a:r>
+              <a:rPr lang="en-US" sz="3400" dirty="0"/>
+              <a:t>:</a:t>
+            </a:r>
+            <a:endParaRPr lang="en-US" sz="3400" dirty="0">
               <a:cs typeface="Calibri"/>
             </a:endParaRPr>
           </a:p>
@@ -25798,7 +26494,7 @@
               </a:buClr>
             </a:pPr>
             <a:r>
-              <a:rPr lang="ru-RU" sz="3150" b="1" dirty="0">
+              <a:rPr lang="ru-RU" sz="3200" b="1" dirty="0">
                 <a:solidFill>
                   <a:schemeClr val="bg1"/>
                 </a:solidFill>
@@ -25808,7 +26504,7 @@
               <a:t>Message</a:t>
             </a:r>
             <a:r>
-              <a:rPr lang="ru-RU" sz="3150" dirty="0">
+              <a:rPr lang="ru-RU" sz="3200" dirty="0">
                 <a:solidFill>
                   <a:schemeClr val="tx2">
                     <a:lumMod val="75000"/>
@@ -25818,14 +26514,14 @@
               <a:t> </a:t>
             </a:r>
             <a:r>
-              <a:rPr lang="ru-RU" sz="3150" dirty="0"/>
+              <a:rPr lang="ru-RU" sz="3200" dirty="0"/>
               <a:t>–</a:t>
             </a:r>
             <a:r>
-              <a:rPr lang="en-US" sz="3150" dirty="0"/>
+              <a:rPr lang="en-US" sz="3200" dirty="0"/>
               <a:t> дава описание на грешката</a:t>
             </a:r>
-            <a:endParaRPr lang="ru-RU" dirty="0">
+            <a:endParaRPr lang="ru-RU" sz="3200" dirty="0">
               <a:cs typeface="Calibri"/>
             </a:endParaRPr>
           </a:p>
@@ -25839,7 +26535,7 @@
               </a:buClr>
             </a:pPr>
             <a:r>
-              <a:rPr lang="ru-RU" sz="2950" b="1" dirty="0">
+              <a:rPr lang="ru-RU" sz="3000" b="1" dirty="0">
                 <a:solidFill>
                   <a:schemeClr val="bg1"/>
                 </a:solidFill>
@@ -25849,7 +26545,7 @@
               <a:t>StackTrace</a:t>
             </a:r>
             <a:r>
-              <a:rPr lang="ru-RU" sz="2950" dirty="0">
+              <a:rPr lang="ru-RU" sz="3000" dirty="0">
                 <a:solidFill>
                   <a:schemeClr val="tx2">
                     <a:lumMod val="75000"/>
@@ -25859,15 +26555,15 @@
               <a:t> </a:t>
             </a:r>
             <a:r>
-              <a:rPr lang="ru-RU" sz="2950" dirty="0"/>
+              <a:rPr lang="ru-RU" sz="3000" dirty="0"/>
               <a:t>– </a:t>
             </a:r>
             <a:r>
-              <a:rPr lang="en-US" sz="2950" dirty="0"/>
+              <a:rPr lang="en-US" sz="3000" dirty="0"/>
               <a:t>дава информация на стека по-време на хвърляне на </a:t>
             </a:r>
             <a:r>
-              <a:rPr lang="en-US" sz="2950" dirty="0">
+              <a:rPr lang="en-US" sz="3000" dirty="0">
                 <a:ea typeface="+mn-lt"/>
                 <a:cs typeface="+mn-lt"/>
               </a:rPr>
@@ -25884,7 +26580,7 @@
               </a:buClr>
             </a:pPr>
             <a:r>
-              <a:rPr lang="ru-RU" sz="2950" b="1" dirty="0">
+              <a:rPr lang="ru-RU" sz="3000" b="1" dirty="0">
                 <a:solidFill>
                   <a:schemeClr val="bg1"/>
                 </a:solidFill>
@@ -25894,7 +26590,7 @@
               <a:t>InnerException</a:t>
             </a:r>
             <a:r>
-              <a:rPr lang="ru-RU" sz="2950" dirty="0">
+              <a:rPr lang="ru-RU" sz="3000" dirty="0">
                 <a:solidFill>
                   <a:schemeClr val="tx2">
                     <a:lumMod val="75000"/>
@@ -25904,35 +26600,21 @@
               <a:t> </a:t>
             </a:r>
             <a:r>
-              <a:rPr lang="ru-RU" sz="2950" dirty="0"/>
+              <a:rPr lang="ru-RU" sz="3000" dirty="0"/>
               <a:t>–</a:t>
             </a:r>
             <a:r>
-              <a:rPr lang="en-US" sz="2950" dirty="0"/>
+              <a:rPr lang="en-US" sz="3000" dirty="0"/>
               <a:t> exception</a:t>
             </a:r>
             <a:r>
-              <a:rPr lang="en-US" sz="2950" dirty="0">
+              <a:rPr lang="en-US" sz="3000" dirty="0">
                 <a:ea typeface="+mn-lt"/>
                 <a:cs typeface="+mn-lt"/>
               </a:rPr>
-              <a:t>, който е приченил сегашния exception (</a:t>
-            </a:r>
-            <a:r>
-              <a:rPr lang="en-US" sz="2950" dirty="0" err="1">
-                <a:ea typeface="+mn-lt"/>
-                <a:cs typeface="+mn-lt"/>
-              </a:rPr>
-              <a:t>ако</a:t>
-            </a:r>
-            <a:r>
-              <a:rPr lang="en-US" sz="2950" dirty="0">
-                <a:ea typeface="+mn-lt"/>
-                <a:cs typeface="+mn-lt"/>
-              </a:rPr>
-              <a:t> има)</a:t>
-            </a:r>
-            <a:endParaRPr lang="en-US" dirty="0">
+              <a:t>, който е приченил сегашния exception (ако има)</a:t>
+            </a:r>
+            <a:endParaRPr lang="en-US" sz="3000" dirty="0">
               <a:cs typeface="Calibri"/>
             </a:endParaRPr>
           </a:p>
@@ -25956,21 +26638,23 @@
         </p:nvSpPr>
         <p:spPr/>
         <p:txBody>
-          <a:bodyPr/>
+          <a:bodyPr>
+            <a:normAutofit/>
+          </a:bodyPr>
           <a:lstStyle/>
           <a:p>
             <a:r>
-              <a:rPr lang="bg-BG" sz="3950" dirty="0"/>
+              <a:rPr lang="bg-BG" sz="4000" dirty="0"/>
               <a:t>Клас </a:t>
             </a:r>
             <a:r>
-              <a:rPr lang="en-US" sz="3950" noProof="1">
+              <a:rPr lang="en-US" sz="4000" noProof="1">
                 <a:latin typeface="Consolas"/>
                 <a:cs typeface="Consolas" pitchFamily="49" charset="0"/>
               </a:rPr>
               <a:t>System.Exception</a:t>
             </a:r>
-            <a:endParaRPr lang="en-US" sz="3950" dirty="0">
+            <a:endParaRPr lang="en-US" sz="4000" dirty="0">
               <a:cs typeface="Calibri"/>
             </a:endParaRPr>
           </a:p>
@@ -26310,55 +26994,6 @@
                       </p:childTnLst>
                     </p:cTn>
                   </p:par>
-                  <p:par>
-                    <p:cTn id="17" fill="hold">
-                      <p:stCondLst>
-                        <p:cond delay="indefinite"/>
-                      </p:stCondLst>
-                      <p:childTnLst>
-                        <p:par>
-                          <p:cTn id="18" fill="hold">
-                            <p:stCondLst>
-                              <p:cond delay="0"/>
-                            </p:stCondLst>
-                            <p:childTnLst>
-                              <p:par>
-                                <p:cTn id="19" presetID="1" presetClass="entr" presetSubtype="0" fill="hold" nodeType="clickEffect">
-                                  <p:stCondLst>
-                                    <p:cond delay="0"/>
-                                  </p:stCondLst>
-                                  <p:childTnLst>
-                                    <p:set>
-                                      <p:cBhvr>
-                                        <p:cTn id="20" dur="1" fill="hold">
-                                          <p:stCondLst>
-                                            <p:cond delay="0"/>
-                                          </p:stCondLst>
-                                        </p:cTn>
-                                        <p:tgtEl>
-                                          <p:spTgt spid="2">
-                                            <p:txEl>
-                                              <p:pRg st="5" end="5"/>
-                                            </p:txEl>
-                                          </p:spTgt>
-                                        </p:tgtEl>
-                                        <p:attrNameLst>
-                                          <p:attrName>style.visibility</p:attrName>
-                                        </p:attrNameLst>
-                                      </p:cBhvr>
-                                      <p:to>
-                                        <p:strVal val="visible"/>
-                                      </p:to>
-                                    </p:set>
-                                  </p:childTnLst>
-                                </p:cTn>
-                              </p:par>
-                            </p:childTnLst>
-                          </p:cTn>
-                        </p:par>
-                      </p:childTnLst>
-                    </p:cTn>
-                  </p:par>
                 </p:childTnLst>
               </p:cTn>
               <p:prevCondLst>
@@ -26403,35 +27038,6 @@
       </p:grpSpPr>
       <p:sp>
         <p:nvSpPr>
-          <p:cNvPr id="2" name="Title 1">
-            <a:extLst>
-              <a:ext uri="{FF2B5EF4-FFF2-40B4-BE49-F238E27FC236}">
-                <a16:creationId xmlns:a16="http://schemas.microsoft.com/office/drawing/2014/main" id="{35E2F701-5968-4037-B0F1-B55B3C48F180}"/>
-              </a:ext>
-            </a:extLst>
-          </p:cNvPr>
-          <p:cNvSpPr>
-            <a:spLocks noGrp="1"/>
-          </p:cNvSpPr>
-          <p:nvPr>
-            <p:ph type="title"/>
-          </p:nvPr>
-        </p:nvSpPr>
-        <p:spPr/>
-        <p:txBody>
-          <a:bodyPr/>
-          <a:lstStyle/>
-          <a:p>
-            <a:r>
-              <a:rPr lang="en-US" sz="3950" dirty="0"/>
-              <a:t>Хващане на exception</a:t>
-            </a:r>
-            <a:endParaRPr lang="en-US" dirty="0"/>
-          </a:p>
-        </p:txBody>
-      </p:sp>
-      <p:sp>
-        <p:nvSpPr>
           <p:cNvPr id="3" name="Text Placeholder 2">
             <a:extLst>
               <a:ext uri="{FF2B5EF4-FFF2-40B4-BE49-F238E27FC236}">
@@ -26465,11 +27071,11 @@
               <a:t>В C# </a:t>
             </a:r>
             <a:r>
-              <a:rPr lang="en-US" sz="3600" dirty="0">
+              <a:rPr lang="bg-BG" sz="3600" dirty="0">
                 <a:ea typeface="+mn-lt"/>
                 <a:cs typeface="+mn-lt"/>
               </a:rPr>
-              <a:t>exception-ите могат да бъдат хванати с конструктура </a:t>
+              <a:t>изключенията могат да бъдат хванати с конструкцията </a:t>
             </a:r>
             <a:r>
               <a:rPr lang="en-US" sz="3600" b="1" dirty="0">
@@ -26534,14 +27140,14 @@
                 <a:spcPct val="100000"/>
               </a:lnSpc>
               <a:spcBef>
-                <a:spcPts val="2399"/>
+                <a:spcPts val="3000"/>
               </a:spcBef>
               <a:buClr>
                 <a:srgbClr val="234465"/>
               </a:buClr>
             </a:pPr>
             <a:r>
-              <a:rPr lang="en-US" sz="3600" dirty="0">
+              <a:rPr lang="bg-BG" sz="3600" dirty="0">
                 <a:solidFill>
                   <a:srgbClr val="234465"/>
                 </a:solidFill>
@@ -26551,14 +27157,14 @@
               <a:t>Блокът</a:t>
             </a:r>
             <a:r>
-              <a:rPr lang="en-US" sz="3600" dirty="0">
+              <a:rPr lang="bg-BG" sz="3600" dirty="0">
                 <a:ea typeface="+mn-lt"/>
                 <a:cs typeface="+mn-lt"/>
               </a:rPr>
               <a:t> </a:t>
             </a:r>
             <a:r>
-              <a:rPr lang="ru-RU" sz="3600" b="1" dirty="0">
+              <a:rPr lang="bg-BG" sz="3600" b="1" dirty="0">
                 <a:solidFill>
                   <a:schemeClr val="bg1"/>
                 </a:solidFill>
@@ -26568,7 +27174,7 @@
               <a:t>catch</a:t>
             </a:r>
             <a:r>
-              <a:rPr lang="ru-RU" sz="3600" dirty="0">
+              <a:rPr lang="bg-BG" sz="3600" dirty="0">
                 <a:solidFill>
                   <a:schemeClr val="tx2">
                     <a:lumMod val="75000"/>
@@ -26578,15 +27184,50 @@
               <a:t>  може да се използва много пъти за различни типове </a:t>
             </a:r>
             <a:r>
-              <a:rPr lang="en-US" sz="3600" dirty="0">
+              <a:rPr lang="bg-BG" sz="3600" dirty="0">
                 <a:ea typeface="+mn-lt"/>
                 <a:cs typeface="+mn-lt"/>
               </a:rPr>
-              <a:t>exception</a:t>
-            </a:r>
-            <a:endParaRPr lang="en-US" sz="3600" dirty="0">
+              <a:t>изключения</a:t>
+            </a:r>
+            <a:endParaRPr lang="bg-BG" sz="3600" dirty="0">
               <a:cs typeface="Calibri"/>
             </a:endParaRPr>
+          </a:p>
+        </p:txBody>
+      </p:sp>
+      <p:sp>
+        <p:nvSpPr>
+          <p:cNvPr id="2" name="Title 1">
+            <a:extLst>
+              <a:ext uri="{FF2B5EF4-FFF2-40B4-BE49-F238E27FC236}">
+                <a16:creationId xmlns:a16="http://schemas.microsoft.com/office/drawing/2014/main" id="{35E2F701-5968-4037-B0F1-B55B3C48F180}"/>
+              </a:ext>
+            </a:extLst>
+          </p:cNvPr>
+          <p:cNvSpPr>
+            <a:spLocks noGrp="1"/>
+          </p:cNvSpPr>
+          <p:nvPr>
+            <p:ph type="title"/>
+          </p:nvPr>
+        </p:nvSpPr>
+        <p:spPr/>
+        <p:txBody>
+          <a:bodyPr>
+            <a:normAutofit/>
+          </a:bodyPr>
+          <a:lstStyle/>
+          <a:p>
+            <a:r>
+              <a:rPr lang="en-US" sz="4000" dirty="0"/>
+              <a:t>Хващане на </a:t>
+            </a:r>
+            <a:r>
+              <a:rPr lang="bg-BG" sz="4000" dirty="0"/>
+              <a:t>изключение</a:t>
+            </a:r>
+            <a:endParaRPr lang="en-US" sz="4000" dirty="0"/>
           </a:p>
         </p:txBody>
       </p:sp>
@@ -26606,8 +27247,8 @@
         </p:nvSpPr>
         <p:spPr bwMode="auto">
           <a:xfrm>
-            <a:off x="1551000" y="2304000"/>
-            <a:ext cx="10710000" cy="2618653"/>
+            <a:off x="2316000" y="2430347"/>
+            <a:ext cx="9360000" cy="2618653"/>
           </a:xfrm>
           <a:prstGeom prst="rect">
             <a:avLst/>
@@ -26671,18 +27312,15 @@
                 <a:latin typeface="Consolas" pitchFamily="49" charset="0"/>
                 <a:cs typeface="Consolas" pitchFamily="49" charset="0"/>
               </a:rPr>
-              <a:t>Използвайте код, който може да предизвика </a:t>
-            </a:r>
-            <a:r>
-              <a:rPr lang="en-US" sz="2600" b="1" i="1" noProof="1">
-                <a:solidFill>
-                  <a:schemeClr val="accent2"/>
-                </a:solidFill>
-                <a:latin typeface="Consolas" pitchFamily="49" charset="0"/>
-                <a:cs typeface="Consolas" pitchFamily="49" charset="0"/>
-              </a:rPr>
-              <a:t>exception</a:t>
-            </a:r>
+              <a:t>Код, който може да предизвика грешка</a:t>
+            </a:r>
+            <a:endParaRPr lang="en-US" sz="2600" b="1" i="1" noProof="1">
+              <a:solidFill>
+                <a:schemeClr val="accent2"/>
+              </a:solidFill>
+              <a:latin typeface="Consolas" pitchFamily="49" charset="0"/>
+              <a:cs typeface="Consolas" pitchFamily="49" charset="0"/>
+            </a:endParaRPr>
           </a:p>
           <a:p>
             <a:pPr defTabSz="1218072" latinLnBrk="1"/>
@@ -26741,7 +27379,7 @@
                 <a:latin typeface="Consolas" pitchFamily="49" charset="0"/>
                 <a:cs typeface="Consolas" pitchFamily="49" charset="0"/>
               </a:rPr>
-              <a:t>  // </a:t>
+              <a:t>  //</a:t>
             </a:r>
             <a:r>
               <a:rPr lang="bg-BG" sz="2600" b="1" i="1" noProof="1">
@@ -26751,18 +27389,15 @@
                 <a:latin typeface="Consolas" pitchFamily="49" charset="0"/>
                 <a:cs typeface="Consolas" pitchFamily="49" charset="0"/>
               </a:rPr>
-              <a:t>Хващане на </a:t>
-            </a:r>
-            <a:r>
-              <a:rPr lang="en-US" sz="2600" b="1" i="1" noProof="1">
-                <a:solidFill>
-                  <a:schemeClr val="accent2"/>
-                </a:solidFill>
-                <a:latin typeface="Consolas" pitchFamily="49" charset="0"/>
-                <a:cs typeface="Consolas" pitchFamily="49" charset="0"/>
-              </a:rPr>
-              <a:t>exception</a:t>
-            </a:r>
+              <a:t> Код, който се изпълнява, ако възникне грешка</a:t>
+            </a:r>
+            <a:endParaRPr lang="en-US" sz="2600" b="1" i="1" noProof="1">
+              <a:solidFill>
+                <a:schemeClr val="accent2"/>
+              </a:solidFill>
+              <a:latin typeface="Consolas" pitchFamily="49" charset="0"/>
+              <a:cs typeface="Consolas" pitchFamily="49" charset="0"/>
+            </a:endParaRPr>
           </a:p>
           <a:p>
             <a:pPr defTabSz="1218072" latinLnBrk="1"/>
@@ -27176,15 +27811,19 @@
           <a:lstStyle/>
           <a:p>
             <a:r>
-              <a:rPr lang="en-US" sz="3950" dirty="0">
+              <a:rPr lang="en-US" sz="3950">
                 <a:ea typeface="+mj-lt"/>
                 <a:cs typeface="+mj-lt"/>
               </a:rPr>
               <a:t>Йерархия на </a:t>
             </a:r>
             <a:r>
-              <a:rPr lang="en-US" sz="3950" dirty="0"/>
-              <a:t>exception в .NET</a:t>
+              <a:rPr lang="bg-BG" sz="3950"/>
+              <a:t>изключенията</a:t>
+            </a:r>
+            <a:r>
+              <a:rPr lang="en-US" sz="3950"/>
+              <a:t> в .NET</a:t>
             </a:r>
             <a:endParaRPr lang="bg-BG" sz="3950" dirty="0"/>
           </a:p>
@@ -28879,6 +29518,44 @@
       </p:pic>
       <p:sp>
         <p:nvSpPr>
+          <p:cNvPr id="4" name="Subtitle 3">
+            <a:extLst>
+              <a:ext uri="{FF2B5EF4-FFF2-40B4-BE49-F238E27FC236}">
+                <a16:creationId xmlns:a16="http://schemas.microsoft.com/office/drawing/2014/main" id="{267DB33E-75B9-5BA4-6C58-804892D26A5A}"/>
+              </a:ext>
+            </a:extLst>
+          </p:cNvPr>
+          <p:cNvSpPr>
+            <a:spLocks noGrp="1"/>
+          </p:cNvSpPr>
+          <p:nvPr>
+            <p:ph type="subTitle" sz="quarter" idx="11"/>
+          </p:nvPr>
+        </p:nvSpPr>
+        <p:spPr/>
+        <p:txBody>
+          <a:bodyPr/>
+          <a:lstStyle/>
+          <a:p>
+            <a:r>
+              <a:rPr lang="en-GB" dirty="0">
+                <a:latin typeface="Consolas" panose="020B0609020204030204" pitchFamily="49" charset="0"/>
+                <a:cs typeface="Consolas" panose="020B0609020204030204" pitchFamily="49" charset="0"/>
+              </a:rPr>
+              <a:t>t</a:t>
+            </a:r>
+            <a:r>
+              <a:rPr lang="en-BG" dirty="0">
+                <a:latin typeface="Consolas" panose="020B0609020204030204" pitchFamily="49" charset="0"/>
+                <a:cs typeface="Consolas" panose="020B0609020204030204" pitchFamily="49" charset="0"/>
+              </a:rPr>
+              <a:t>ry-catch</a:t>
+            </a:r>
+          </a:p>
+        </p:txBody>
+      </p:sp>
+      <p:sp>
+        <p:nvSpPr>
           <p:cNvPr id="3" name="Title 2">
             <a:extLst>
               <a:ext uri="{FF2B5EF4-FFF2-40B4-BE49-F238E27FC236}">
@@ -28893,16 +29570,23 @@
             <p:ph type="title" sz="quarter" idx="10"/>
           </p:nvPr>
         </p:nvSpPr>
-        <p:spPr/>
+        <p:spPr>
+          <a:xfrm>
+            <a:off x="615109" y="4704825"/>
+            <a:ext cx="10961783" cy="768084"/>
+          </a:xfrm>
+        </p:spPr>
         <p:txBody>
           <a:bodyPr/>
           <a:lstStyle/>
           <a:p>
             <a:r>
-              <a:rPr lang="en-US" sz="5350" dirty="0">
-                <a:cs typeface="Arial"/>
-              </a:rPr>
-              <a:t>Хващане на exception</a:t>
+              <a:rPr lang="en-US" dirty="0"/>
+              <a:t>Хващане на </a:t>
+            </a:r>
+            <a:r>
+              <a:rPr lang="bg-BG" dirty="0"/>
+              <a:t>изключения</a:t>
             </a:r>
             <a:endParaRPr lang="en-US" dirty="0"/>
           </a:p>

</xml_diff>